<commit_message>
added module names in hardware block diagram
</commit_message>
<xml_diff>
--- a/EADAS - 12-7.pptx
+++ b/EADAS - 12-7.pptx
@@ -2363,45 +2363,45 @@
     </dgm:pt>
   </dgm:ptLst>
   <dgm:cxnLst>
+    <dgm:cxn modelId="{68A2EE0D-3397-439F-B1DF-D32455C4649E}" srcId="{2FB12820-BFC5-454C-9787-61A53B0E9994}" destId="{32590F4F-516D-4DC7-88C9-4D316DE1ACD0}" srcOrd="4" destOrd="0" parTransId="{827D1EF0-F38B-4CE2-A294-0331E4C5FD81}" sibTransId="{6D9C4255-C055-4A14-9F65-72FF33284BAA}"/>
+    <dgm:cxn modelId="{0FF30198-A56E-4EF1-962B-1E56CA501DCC}" type="presOf" srcId="{4C3CFDD8-4C2A-401B-8B8C-1C4CB05530F5}" destId="{BE84B352-6350-49CA-A0E0-E680EAC5A2F7}" srcOrd="0" destOrd="0" presId="urn:microsoft.com/office/officeart/2005/8/layout/bProcess3"/>
     <dgm:cxn modelId="{78E13E71-B725-4855-80F9-1418DFEBCB22}" type="presOf" srcId="{B573ADB8-4670-49BB-8FA7-AA94CD2AC0BB}" destId="{70B5A6B8-6481-4237-AAE5-1BC885BF910D}" srcOrd="1" destOrd="0" presId="urn:microsoft.com/office/officeart/2005/8/layout/bProcess3"/>
-    <dgm:cxn modelId="{0FF30198-A56E-4EF1-962B-1E56CA501DCC}" type="presOf" srcId="{4C3CFDD8-4C2A-401B-8B8C-1C4CB05530F5}" destId="{BE84B352-6350-49CA-A0E0-E680EAC5A2F7}" srcOrd="0" destOrd="0" presId="urn:microsoft.com/office/officeart/2005/8/layout/bProcess3"/>
+    <dgm:cxn modelId="{4268F731-5DDC-455D-9D68-8034D7C73576}" srcId="{2FB12820-BFC5-454C-9787-61A53B0E9994}" destId="{E15660AC-4016-462A-832E-322349063B80}" srcOrd="1" destOrd="0" parTransId="{E86BA27C-D530-47BE-9057-02D7712EEE73}" sibTransId="{AD2FC0CE-6613-4938-AE62-10406A58E601}"/>
+    <dgm:cxn modelId="{2DAB578F-1BBD-44E9-B64D-6727013375D8}" type="presOf" srcId="{B6F934CF-290B-4FA0-AAC7-3818C7555E65}" destId="{F0C0444C-63CE-47EC-AAC3-5852866E01FC}" srcOrd="0" destOrd="0" presId="urn:microsoft.com/office/officeart/2005/8/layout/bProcess3"/>
+    <dgm:cxn modelId="{1CD2D3B9-AD6B-4445-B8B4-59AE1031362F}" type="presOf" srcId="{BF9FA62E-7579-43B9-8FAF-374FF9D57A00}" destId="{94A59AA3-1B19-4363-97B0-4D19638B2975}" srcOrd="0" destOrd="0" presId="urn:microsoft.com/office/officeart/2005/8/layout/bProcess3"/>
+    <dgm:cxn modelId="{C1BBA867-FA4E-4A54-8044-C8C413995ACD}" type="presOf" srcId="{E5AD4D4A-DB5E-479A-9465-8998121777F0}" destId="{A489D72E-D714-41EB-A491-8410D3477EDA}" srcOrd="1" destOrd="0" presId="urn:microsoft.com/office/officeart/2005/8/layout/bProcess3"/>
+    <dgm:cxn modelId="{BB71C789-D007-4E05-9331-F835BFAC3C4F}" type="presOf" srcId="{B573ADB8-4670-49BB-8FA7-AA94CD2AC0BB}" destId="{3E7C6428-6DA4-4D25-858A-0DFEEDFF2E71}" srcOrd="0" destOrd="0" presId="urn:microsoft.com/office/officeart/2005/8/layout/bProcess3"/>
+    <dgm:cxn modelId="{D0E8FFC8-0D31-478F-BE2E-6A74EF0BB180}" type="presOf" srcId="{6B59BAF7-2038-440C-80F0-FD549C881FC6}" destId="{6FFAA269-3B12-4F15-88DB-B3C5BD70FAA7}" srcOrd="0" destOrd="0" presId="urn:microsoft.com/office/officeart/2005/8/layout/bProcess3"/>
+    <dgm:cxn modelId="{75A130DD-E4E7-43C5-8DC0-3A5E7A0693E1}" type="presOf" srcId="{07C291EB-1EBD-4E1D-A644-7A862E26DE25}" destId="{EEB5D5FB-5978-41F9-8B10-F0FEDB1B938D}" srcOrd="0" destOrd="0" presId="urn:microsoft.com/office/officeart/2005/8/layout/bProcess3"/>
+    <dgm:cxn modelId="{5DC2A8C3-306D-44BE-9904-EC3397C9DBF7}" type="presOf" srcId="{E15660AC-4016-462A-832E-322349063B80}" destId="{4A890EBE-B780-45D5-8A51-B1CB265B8AAE}" srcOrd="0" destOrd="0" presId="urn:microsoft.com/office/officeart/2005/8/layout/bProcess3"/>
+    <dgm:cxn modelId="{18BAEAEE-B172-4E88-A352-F79EC34A48B2}" type="presOf" srcId="{A19AE1EF-2A88-4A61-9C2A-3CE023B6E391}" destId="{A1015FA7-56BE-4BF1-972E-1B3C95ACCDAF}" srcOrd="1" destOrd="0" presId="urn:microsoft.com/office/officeart/2005/8/layout/bProcess3"/>
+    <dgm:cxn modelId="{3B43BE66-7F3E-44E0-8268-3FD672FF87D0}" type="presOf" srcId="{AD2FC0CE-6613-4938-AE62-10406A58E601}" destId="{145FE141-A9C8-42EC-BF09-1386421C1807}" srcOrd="0" destOrd="0" presId="urn:microsoft.com/office/officeart/2005/8/layout/bProcess3"/>
+    <dgm:cxn modelId="{0E573E6B-5054-4870-BFCE-63C0A87F74CB}" type="presOf" srcId="{A19AE1EF-2A88-4A61-9C2A-3CE023B6E391}" destId="{2E4734A0-54BF-44DD-942C-27E70798EE10}" srcOrd="0" destOrd="0" presId="urn:microsoft.com/office/officeart/2005/8/layout/bProcess3"/>
+    <dgm:cxn modelId="{F07E89B4-1E6A-4FFF-83E1-8A2CED8E2F70}" type="presOf" srcId="{136C1526-7866-406B-A77E-9EA111240E3C}" destId="{CBA5EEDD-9529-4AF3-A40E-AB230ED9F5E8}" srcOrd="0" destOrd="0" presId="urn:microsoft.com/office/officeart/2005/8/layout/bProcess3"/>
     <dgm:cxn modelId="{63A68D4C-D763-4084-85F7-375886C8CF7E}" type="presOf" srcId="{691C1182-2621-4D94-8064-4FB004350FA1}" destId="{902DF144-89EF-445D-9693-14DE3C070FF7}" srcOrd="1" destOrd="0" presId="urn:microsoft.com/office/officeart/2005/8/layout/bProcess3"/>
+    <dgm:cxn modelId="{1D73EDAD-973F-4086-9434-093A02AA8161}" type="presOf" srcId="{23A73FB3-7635-4F3F-A406-51BC12947BE1}" destId="{BFD6E834-940B-4D42-9CEB-0110FE058861}" srcOrd="0" destOrd="0" presId="urn:microsoft.com/office/officeart/2005/8/layout/bProcess3"/>
+    <dgm:cxn modelId="{FABB4D3B-C682-403B-9173-D38452F85767}" type="presOf" srcId="{32ABA6DA-6961-4EF2-A8C0-9789FACDECBF}" destId="{9EDB04EB-847E-4BCF-A3F1-995CAEE8E58A}" srcOrd="0" destOrd="0" presId="urn:microsoft.com/office/officeart/2005/8/layout/bProcess3"/>
+    <dgm:cxn modelId="{1024E824-313C-4061-9E24-DEB830F17B63}" srcId="{2FB12820-BFC5-454C-9787-61A53B0E9994}" destId="{32ABA6DA-6961-4EF2-A8C0-9789FACDECBF}" srcOrd="0" destOrd="0" parTransId="{CF88BD51-1163-4BE3-960D-ADE79FC7AA0F}" sibTransId="{691C1182-2621-4D94-8064-4FB004350FA1}"/>
+    <dgm:cxn modelId="{16702609-4CB6-4F72-AAE8-F8F4B0AA2293}" type="presOf" srcId="{88DBF64F-6FBF-4E14-A940-71DEC4A5925A}" destId="{53DF9181-241A-4A7C-9BEE-5009FCF2D5B5}" srcOrd="0" destOrd="0" presId="urn:microsoft.com/office/officeart/2005/8/layout/bProcess3"/>
+    <dgm:cxn modelId="{4C7031AB-8255-4AC8-9D1A-2961A004DD92}" type="presOf" srcId="{32590F4F-516D-4DC7-88C9-4D316DE1ACD0}" destId="{F3C8BFCA-9CC9-4C25-A54B-1525D2627BD3}" srcOrd="0" destOrd="0" presId="urn:microsoft.com/office/officeart/2005/8/layout/bProcess3"/>
+    <dgm:cxn modelId="{018F8B0A-A821-448E-9027-CA9FB297449B}" type="presOf" srcId="{691C1182-2621-4D94-8064-4FB004350FA1}" destId="{B3DF7052-FDAE-4F83-9F23-3EC25FBDFCBD}" srcOrd="0" destOrd="0" presId="urn:microsoft.com/office/officeart/2005/8/layout/bProcess3"/>
+    <dgm:cxn modelId="{F5CB99E2-60C0-4E87-91FF-EA38F6C3100A}" type="presOf" srcId="{3B8F518A-AC58-4143-AFD3-6CBBB94494C3}" destId="{34FB6637-BD61-4226-B789-D2E8D9DB4DFF}" srcOrd="0" destOrd="0" presId="urn:microsoft.com/office/officeart/2005/8/layout/bProcess3"/>
+    <dgm:cxn modelId="{6BBB4402-B105-4A98-B04B-EF41BDD6A04A}" srcId="{2FB12820-BFC5-454C-9787-61A53B0E9994}" destId="{88DBF64F-6FBF-4E14-A940-71DEC4A5925A}" srcOrd="9" destOrd="0" parTransId="{714930FA-E25B-4AD7-A44B-CCE517F48560}" sibTransId="{DC976F80-B5BA-430A-BB6C-549FC489A185}"/>
+    <dgm:cxn modelId="{52D9D26D-3DF1-48CA-8BF5-98230DBB75B3}" type="presOf" srcId="{6D9C4255-C055-4A14-9F65-72FF33284BAA}" destId="{CA7FC324-F4B5-4432-AAA5-C5AD37DEDD5B}" srcOrd="0" destOrd="0" presId="urn:microsoft.com/office/officeart/2005/8/layout/bProcess3"/>
+    <dgm:cxn modelId="{5D6FE326-C8CC-4FD6-97E1-2D822936C3AA}" type="presOf" srcId="{E5AD4D4A-DB5E-479A-9465-8998121777F0}" destId="{817866E2-1FDE-41EA-9AB1-66EFD00E7850}" srcOrd="0" destOrd="0" presId="urn:microsoft.com/office/officeart/2005/8/layout/bProcess3"/>
     <dgm:cxn modelId="{403E4E40-5228-445F-9D10-72A79782A6D6}" type="presOf" srcId="{6D9C4255-C055-4A14-9F65-72FF33284BAA}" destId="{99A74944-719B-4540-8A30-08AFA98871D7}" srcOrd="1" destOrd="0" presId="urn:microsoft.com/office/officeart/2005/8/layout/bProcess3"/>
-    <dgm:cxn modelId="{68A2EE0D-3397-439F-B1DF-D32455C4649E}" srcId="{2FB12820-BFC5-454C-9787-61A53B0E9994}" destId="{32590F4F-516D-4DC7-88C9-4D316DE1ACD0}" srcOrd="4" destOrd="0" parTransId="{827D1EF0-F38B-4CE2-A294-0331E4C5FD81}" sibTransId="{6D9C4255-C055-4A14-9F65-72FF33284BAA}"/>
     <dgm:cxn modelId="{EF1E5D24-EBBB-4C7B-9984-2FE6567071FF}" type="presOf" srcId="{3B8F518A-AC58-4143-AFD3-6CBBB94494C3}" destId="{A49AA734-21B1-4A5E-96B7-90C67AB1B57F}" srcOrd="1" destOrd="0" presId="urn:microsoft.com/office/officeart/2005/8/layout/bProcess3"/>
+    <dgm:cxn modelId="{0A4CCD14-A1F8-483A-9C50-CDA0D6624FBB}" srcId="{2FB12820-BFC5-454C-9787-61A53B0E9994}" destId="{23A73FB3-7635-4F3F-A406-51BC12947BE1}" srcOrd="8" destOrd="0" parTransId="{130664AA-F273-4CBF-85A1-C9CF690E4124}" sibTransId="{6B59BAF7-2038-440C-80F0-FD549C881FC6}"/>
+    <dgm:cxn modelId="{D8802A15-84EF-40A1-A298-CB7E0FC48DAF}" type="presOf" srcId="{6B59BAF7-2038-440C-80F0-FD549C881FC6}" destId="{C5F4E97A-D741-4898-B236-454A7829C49D}" srcOrd="1" destOrd="0" presId="urn:microsoft.com/office/officeart/2005/8/layout/bProcess3"/>
+    <dgm:cxn modelId="{92F08059-C54E-4F3B-AE9B-1967C99EF439}" type="presOf" srcId="{136C1526-7866-406B-A77E-9EA111240E3C}" destId="{64DFBD11-014E-4D29-A139-AC988834F9C0}" srcOrd="1" destOrd="0" presId="urn:microsoft.com/office/officeart/2005/8/layout/bProcess3"/>
+    <dgm:cxn modelId="{E2D70454-5015-459F-9405-93AAFF9E30BC}" srcId="{2FB12820-BFC5-454C-9787-61A53B0E9994}" destId="{07C291EB-1EBD-4E1D-A644-7A862E26DE25}" srcOrd="5" destOrd="0" parTransId="{96B3BB26-F26B-4A6C-9303-9A25EB2E3095}" sibTransId="{E5AD4D4A-DB5E-479A-9465-8998121777F0}"/>
     <dgm:cxn modelId="{BDA3CE6A-2521-4E08-A417-50FCE8A83E92}" srcId="{2FB12820-BFC5-454C-9787-61A53B0E9994}" destId="{BF9FA62E-7579-43B9-8FAF-374FF9D57A00}" srcOrd="6" destOrd="0" parTransId="{04A48F6B-D45A-40C6-AA8C-4DAEB95F065C}" sibTransId="{A19AE1EF-2A88-4A61-9C2A-3CE023B6E391}"/>
+    <dgm:cxn modelId="{E97F82F2-8A4D-40EE-A825-E03878A3746F}" srcId="{2FB12820-BFC5-454C-9787-61A53B0E9994}" destId="{FE2D6D24-C6A5-4AAC-AC52-D1221A0191A8}" srcOrd="7" destOrd="0" parTransId="{E0555D3C-051E-49F4-8193-687BB499A555}" sibTransId="{B573ADB8-4670-49BB-8FA7-AA94CD2AC0BB}"/>
+    <dgm:cxn modelId="{9C096A4D-43B9-40A6-8BDE-7BD57971572A}" type="presOf" srcId="{FE2D6D24-C6A5-4AAC-AC52-D1221A0191A8}" destId="{B30CA09E-0E35-4B9F-BC72-4F0581B1C912}" srcOrd="0" destOrd="0" presId="urn:microsoft.com/office/officeart/2005/8/layout/bProcess3"/>
     <dgm:cxn modelId="{0F27CEC9-3D02-421D-BF46-C7FCCBCF41F2}" type="presOf" srcId="{AD2FC0CE-6613-4938-AE62-10406A58E601}" destId="{295B4255-4A93-4F08-8314-5EC60AABD937}" srcOrd="1" destOrd="0" presId="urn:microsoft.com/office/officeart/2005/8/layout/bProcess3"/>
-    <dgm:cxn modelId="{18BAEAEE-B172-4E88-A352-F79EC34A48B2}" type="presOf" srcId="{A19AE1EF-2A88-4A61-9C2A-3CE023B6E391}" destId="{A1015FA7-56BE-4BF1-972E-1B3C95ACCDAF}" srcOrd="1" destOrd="0" presId="urn:microsoft.com/office/officeart/2005/8/layout/bProcess3"/>
-    <dgm:cxn modelId="{E2D70454-5015-459F-9405-93AAFF9E30BC}" srcId="{2FB12820-BFC5-454C-9787-61A53B0E9994}" destId="{07C291EB-1EBD-4E1D-A644-7A862E26DE25}" srcOrd="5" destOrd="0" parTransId="{96B3BB26-F26B-4A6C-9303-9A25EB2E3095}" sibTransId="{E5AD4D4A-DB5E-479A-9465-8998121777F0}"/>
-    <dgm:cxn modelId="{92F08059-C54E-4F3B-AE9B-1967C99EF439}" type="presOf" srcId="{136C1526-7866-406B-A77E-9EA111240E3C}" destId="{64DFBD11-014E-4D29-A139-AC988834F9C0}" srcOrd="1" destOrd="0" presId="urn:microsoft.com/office/officeart/2005/8/layout/bProcess3"/>
-    <dgm:cxn modelId="{4268F731-5DDC-455D-9D68-8034D7C73576}" srcId="{2FB12820-BFC5-454C-9787-61A53B0E9994}" destId="{E15660AC-4016-462A-832E-322349063B80}" srcOrd="1" destOrd="0" parTransId="{E86BA27C-D530-47BE-9057-02D7712EEE73}" sibTransId="{AD2FC0CE-6613-4938-AE62-10406A58E601}"/>
-    <dgm:cxn modelId="{F5CB99E2-60C0-4E87-91FF-EA38F6C3100A}" type="presOf" srcId="{3B8F518A-AC58-4143-AFD3-6CBBB94494C3}" destId="{34FB6637-BD61-4226-B789-D2E8D9DB4DFF}" srcOrd="0" destOrd="0" presId="urn:microsoft.com/office/officeart/2005/8/layout/bProcess3"/>
-    <dgm:cxn modelId="{0A4CCD14-A1F8-483A-9C50-CDA0D6624FBB}" srcId="{2FB12820-BFC5-454C-9787-61A53B0E9994}" destId="{23A73FB3-7635-4F3F-A406-51BC12947BE1}" srcOrd="8" destOrd="0" parTransId="{130664AA-F273-4CBF-85A1-C9CF690E4124}" sibTransId="{6B59BAF7-2038-440C-80F0-FD549C881FC6}"/>
-    <dgm:cxn modelId="{3B43BE66-7F3E-44E0-8268-3FD672FF87D0}" type="presOf" srcId="{AD2FC0CE-6613-4938-AE62-10406A58E601}" destId="{145FE141-A9C8-42EC-BF09-1386421C1807}" srcOrd="0" destOrd="0" presId="urn:microsoft.com/office/officeart/2005/8/layout/bProcess3"/>
-    <dgm:cxn modelId="{D0E8FFC8-0D31-478F-BE2E-6A74EF0BB180}" type="presOf" srcId="{6B59BAF7-2038-440C-80F0-FD549C881FC6}" destId="{6FFAA269-3B12-4F15-88DB-B3C5BD70FAA7}" srcOrd="0" destOrd="0" presId="urn:microsoft.com/office/officeart/2005/8/layout/bProcess3"/>
-    <dgm:cxn modelId="{D8802A15-84EF-40A1-A298-CB7E0FC48DAF}" type="presOf" srcId="{6B59BAF7-2038-440C-80F0-FD549C881FC6}" destId="{C5F4E97A-D741-4898-B236-454A7829C49D}" srcOrd="1" destOrd="0" presId="urn:microsoft.com/office/officeart/2005/8/layout/bProcess3"/>
+    <dgm:cxn modelId="{012B66A9-C80A-4372-A149-A54020B5257C}" srcId="{2FB12820-BFC5-454C-9787-61A53B0E9994}" destId="{B6F934CF-290B-4FA0-AAC7-3818C7555E65}" srcOrd="3" destOrd="0" parTransId="{B18D2C18-46A8-4732-AFBD-DE9B274BA6EF}" sibTransId="{3B8F518A-AC58-4143-AFD3-6CBBB94494C3}"/>
     <dgm:cxn modelId="{68A91129-AF19-41DC-8AAE-52C9593DE6BE}" type="presOf" srcId="{2FB12820-BFC5-454C-9787-61A53B0E9994}" destId="{401A3A20-1A54-408F-BCD7-1998E08BBCD3}" srcOrd="0" destOrd="0" presId="urn:microsoft.com/office/officeart/2005/8/layout/bProcess3"/>
-    <dgm:cxn modelId="{0E573E6B-5054-4870-BFCE-63C0A87F74CB}" type="presOf" srcId="{A19AE1EF-2A88-4A61-9C2A-3CE023B6E391}" destId="{2E4734A0-54BF-44DD-942C-27E70798EE10}" srcOrd="0" destOrd="0" presId="urn:microsoft.com/office/officeart/2005/8/layout/bProcess3"/>
-    <dgm:cxn modelId="{BB71C789-D007-4E05-9331-F835BFAC3C4F}" type="presOf" srcId="{B573ADB8-4670-49BB-8FA7-AA94CD2AC0BB}" destId="{3E7C6428-6DA4-4D25-858A-0DFEEDFF2E71}" srcOrd="0" destOrd="0" presId="urn:microsoft.com/office/officeart/2005/8/layout/bProcess3"/>
-    <dgm:cxn modelId="{1CD2D3B9-AD6B-4445-B8B4-59AE1031362F}" type="presOf" srcId="{BF9FA62E-7579-43B9-8FAF-374FF9D57A00}" destId="{94A59AA3-1B19-4363-97B0-4D19638B2975}" srcOrd="0" destOrd="0" presId="urn:microsoft.com/office/officeart/2005/8/layout/bProcess3"/>
-    <dgm:cxn modelId="{2DAB578F-1BBD-44E9-B64D-6727013375D8}" type="presOf" srcId="{B6F934CF-290B-4FA0-AAC7-3818C7555E65}" destId="{F0C0444C-63CE-47EC-AAC3-5852866E01FC}" srcOrd="0" destOrd="0" presId="urn:microsoft.com/office/officeart/2005/8/layout/bProcess3"/>
     <dgm:cxn modelId="{DAEC4893-B38A-4363-8130-0727006D2EFD}" srcId="{2FB12820-BFC5-454C-9787-61A53B0E9994}" destId="{4C3CFDD8-4C2A-401B-8B8C-1C4CB05530F5}" srcOrd="2" destOrd="0" parTransId="{1C62A071-3D45-469B-8EDE-A371453AAD63}" sibTransId="{136C1526-7866-406B-A77E-9EA111240E3C}"/>
-    <dgm:cxn modelId="{1D73EDAD-973F-4086-9434-093A02AA8161}" type="presOf" srcId="{23A73FB3-7635-4F3F-A406-51BC12947BE1}" destId="{BFD6E834-940B-4D42-9CEB-0110FE058861}" srcOrd="0" destOrd="0" presId="urn:microsoft.com/office/officeart/2005/8/layout/bProcess3"/>
-    <dgm:cxn modelId="{F07E89B4-1E6A-4FFF-83E1-8A2CED8E2F70}" type="presOf" srcId="{136C1526-7866-406B-A77E-9EA111240E3C}" destId="{CBA5EEDD-9529-4AF3-A40E-AB230ED9F5E8}" srcOrd="0" destOrd="0" presId="urn:microsoft.com/office/officeart/2005/8/layout/bProcess3"/>
-    <dgm:cxn modelId="{1024E824-313C-4061-9E24-DEB830F17B63}" srcId="{2FB12820-BFC5-454C-9787-61A53B0E9994}" destId="{32ABA6DA-6961-4EF2-A8C0-9789FACDECBF}" srcOrd="0" destOrd="0" parTransId="{CF88BD51-1163-4BE3-960D-ADE79FC7AA0F}" sibTransId="{691C1182-2621-4D94-8064-4FB004350FA1}"/>
-    <dgm:cxn modelId="{5DC2A8C3-306D-44BE-9904-EC3397C9DBF7}" type="presOf" srcId="{E15660AC-4016-462A-832E-322349063B80}" destId="{4A890EBE-B780-45D5-8A51-B1CB265B8AAE}" srcOrd="0" destOrd="0" presId="urn:microsoft.com/office/officeart/2005/8/layout/bProcess3"/>
-    <dgm:cxn modelId="{E97F82F2-8A4D-40EE-A825-E03878A3746F}" srcId="{2FB12820-BFC5-454C-9787-61A53B0E9994}" destId="{FE2D6D24-C6A5-4AAC-AC52-D1221A0191A8}" srcOrd="7" destOrd="0" parTransId="{E0555D3C-051E-49F4-8193-687BB499A555}" sibTransId="{B573ADB8-4670-49BB-8FA7-AA94CD2AC0BB}"/>
-    <dgm:cxn modelId="{75A130DD-E4E7-43C5-8DC0-3A5E7A0693E1}" type="presOf" srcId="{07C291EB-1EBD-4E1D-A644-7A862E26DE25}" destId="{EEB5D5FB-5978-41F9-8B10-F0FEDB1B938D}" srcOrd="0" destOrd="0" presId="urn:microsoft.com/office/officeart/2005/8/layout/bProcess3"/>
-    <dgm:cxn modelId="{6BBB4402-B105-4A98-B04B-EF41BDD6A04A}" srcId="{2FB12820-BFC5-454C-9787-61A53B0E9994}" destId="{88DBF64F-6FBF-4E14-A940-71DEC4A5925A}" srcOrd="9" destOrd="0" parTransId="{714930FA-E25B-4AD7-A44B-CCE517F48560}" sibTransId="{DC976F80-B5BA-430A-BB6C-549FC489A185}"/>
-    <dgm:cxn modelId="{16702609-4CB6-4F72-AAE8-F8F4B0AA2293}" type="presOf" srcId="{88DBF64F-6FBF-4E14-A940-71DEC4A5925A}" destId="{53DF9181-241A-4A7C-9BEE-5009FCF2D5B5}" srcOrd="0" destOrd="0" presId="urn:microsoft.com/office/officeart/2005/8/layout/bProcess3"/>
-    <dgm:cxn modelId="{9C096A4D-43B9-40A6-8BDE-7BD57971572A}" type="presOf" srcId="{FE2D6D24-C6A5-4AAC-AC52-D1221A0191A8}" destId="{B30CA09E-0E35-4B9F-BC72-4F0581B1C912}" srcOrd="0" destOrd="0" presId="urn:microsoft.com/office/officeart/2005/8/layout/bProcess3"/>
-    <dgm:cxn modelId="{4C7031AB-8255-4AC8-9D1A-2961A004DD92}" type="presOf" srcId="{32590F4F-516D-4DC7-88C9-4D316DE1ACD0}" destId="{F3C8BFCA-9CC9-4C25-A54B-1525D2627BD3}" srcOrd="0" destOrd="0" presId="urn:microsoft.com/office/officeart/2005/8/layout/bProcess3"/>
-    <dgm:cxn modelId="{FABB4D3B-C682-403B-9173-D38452F85767}" type="presOf" srcId="{32ABA6DA-6961-4EF2-A8C0-9789FACDECBF}" destId="{9EDB04EB-847E-4BCF-A3F1-995CAEE8E58A}" srcOrd="0" destOrd="0" presId="urn:microsoft.com/office/officeart/2005/8/layout/bProcess3"/>
-    <dgm:cxn modelId="{018F8B0A-A821-448E-9027-CA9FB297449B}" type="presOf" srcId="{691C1182-2621-4D94-8064-4FB004350FA1}" destId="{B3DF7052-FDAE-4F83-9F23-3EC25FBDFCBD}" srcOrd="0" destOrd="0" presId="urn:microsoft.com/office/officeart/2005/8/layout/bProcess3"/>
-    <dgm:cxn modelId="{5D6FE326-C8CC-4FD6-97E1-2D822936C3AA}" type="presOf" srcId="{E5AD4D4A-DB5E-479A-9465-8998121777F0}" destId="{817866E2-1FDE-41EA-9AB1-66EFD00E7850}" srcOrd="0" destOrd="0" presId="urn:microsoft.com/office/officeart/2005/8/layout/bProcess3"/>
-    <dgm:cxn modelId="{C1BBA867-FA4E-4A54-8044-C8C413995ACD}" type="presOf" srcId="{E5AD4D4A-DB5E-479A-9465-8998121777F0}" destId="{A489D72E-D714-41EB-A491-8410D3477EDA}" srcOrd="1" destOrd="0" presId="urn:microsoft.com/office/officeart/2005/8/layout/bProcess3"/>
-    <dgm:cxn modelId="{52D9D26D-3DF1-48CA-8BF5-98230DBB75B3}" type="presOf" srcId="{6D9C4255-C055-4A14-9F65-72FF33284BAA}" destId="{CA7FC324-F4B5-4432-AAA5-C5AD37DEDD5B}" srcOrd="0" destOrd="0" presId="urn:microsoft.com/office/officeart/2005/8/layout/bProcess3"/>
-    <dgm:cxn modelId="{012B66A9-C80A-4372-A149-A54020B5257C}" srcId="{2FB12820-BFC5-454C-9787-61A53B0E9994}" destId="{B6F934CF-290B-4FA0-AAC7-3818C7555E65}" srcOrd="3" destOrd="0" parTransId="{B18D2C18-46A8-4732-AFBD-DE9B274BA6EF}" sibTransId="{3B8F518A-AC58-4143-AFD3-6CBBB94494C3}"/>
     <dgm:cxn modelId="{C9DBF248-B83F-4AFD-A68D-D664E4EAF3A3}" type="presParOf" srcId="{401A3A20-1A54-408F-BCD7-1998E08BBCD3}" destId="{9EDB04EB-847E-4BCF-A3F1-995CAEE8E58A}" srcOrd="0" destOrd="0" presId="urn:microsoft.com/office/officeart/2005/8/layout/bProcess3"/>
     <dgm:cxn modelId="{3A52CD72-DB68-4F3D-A3B1-528E1161C2FD}" type="presParOf" srcId="{401A3A20-1A54-408F-BCD7-1998E08BBCD3}" destId="{B3DF7052-FDAE-4F83-9F23-3EC25FBDFCBD}" srcOrd="1" destOrd="0" presId="urn:microsoft.com/office/officeart/2005/8/layout/bProcess3"/>
     <dgm:cxn modelId="{59431055-AE59-4FC5-A0AA-4E668427456D}" type="presParOf" srcId="{B3DF7052-FDAE-4F83-9F23-3EC25FBDFCBD}" destId="{902DF144-89EF-445D-9693-14DE3C070FF7}" srcOrd="0" destOrd="0" presId="urn:microsoft.com/office/officeart/2005/8/layout/bProcess3"/>
@@ -3071,12 +3071,12 @@
         </a:fontRef>
       </dsp:style>
       <dsp:txBody>
-        <a:bodyPr spcFirstLastPara="0" vert="horz" wrap="square" lIns="113792" tIns="113792" rIns="113792" bIns="113792" numCol="1" spcCol="1270" anchor="ctr" anchorCtr="0">
+        <a:bodyPr spcFirstLastPara="0" vert="horz" wrap="square" lIns="142240" tIns="142240" rIns="142240" bIns="142240" numCol="1" spcCol="1270" anchor="ctr" anchorCtr="0">
           <a:noAutofit/>
         </a:bodyPr>
         <a:lstStyle/>
         <a:p>
-          <a:pPr lvl="0" algn="ctr" defTabSz="711200">
+          <a:pPr lvl="0" algn="ctr" defTabSz="889000">
             <a:lnSpc>
               <a:spcPct val="90000"/>
             </a:lnSpc>
@@ -3088,10 +3088,10 @@
             </a:spcAft>
           </a:pPr>
           <a:r>
-            <a:rPr lang="en-IN" sz="1600" b="1" kern="1200" dirty="0" smtClean="0"/>
+            <a:rPr lang="en-IN" sz="2000" b="1" kern="1200" dirty="0" smtClean="0"/>
             <a:t>Start</a:t>
           </a:r>
-          <a:endParaRPr lang="en-IN" sz="1600" b="1" kern="1200" dirty="0"/>
+          <a:endParaRPr lang="en-IN" sz="2000" b="1" kern="1200" dirty="0"/>
         </a:p>
       </dsp:txBody>
       <dsp:txXfrm>
@@ -3227,12 +3227,12 @@
         </a:fontRef>
       </dsp:style>
       <dsp:txBody>
-        <a:bodyPr spcFirstLastPara="0" vert="horz" wrap="square" lIns="113792" tIns="113792" rIns="113792" bIns="113792" numCol="1" spcCol="1270" anchor="ctr" anchorCtr="0">
+        <a:bodyPr spcFirstLastPara="0" vert="horz" wrap="square" lIns="142240" tIns="142240" rIns="142240" bIns="142240" numCol="1" spcCol="1270" anchor="ctr" anchorCtr="0">
           <a:noAutofit/>
         </a:bodyPr>
         <a:lstStyle/>
         <a:p>
-          <a:pPr lvl="0" algn="ctr" defTabSz="711200">
+          <a:pPr lvl="0" algn="ctr" defTabSz="889000">
             <a:lnSpc>
               <a:spcPct val="90000"/>
             </a:lnSpc>
@@ -3244,10 +3244,10 @@
             </a:spcAft>
           </a:pPr>
           <a:r>
-            <a:rPr lang="en-IN" sz="1600" b="1" kern="1200" dirty="0" smtClean="0"/>
+            <a:rPr lang="en-IN" sz="2000" b="1" kern="1200" dirty="0" smtClean="0"/>
             <a:t>Initialize Clock</a:t>
           </a:r>
-          <a:endParaRPr lang="en-IN" sz="1600" b="1" kern="1200" dirty="0"/>
+          <a:endParaRPr lang="en-IN" sz="2000" b="1" kern="1200" dirty="0"/>
         </a:p>
       </dsp:txBody>
       <dsp:txXfrm>
@@ -3383,12 +3383,12 @@
         </a:fontRef>
       </dsp:style>
       <dsp:txBody>
-        <a:bodyPr spcFirstLastPara="0" vert="horz" wrap="square" lIns="113792" tIns="113792" rIns="113792" bIns="113792" numCol="1" spcCol="1270" anchor="ctr" anchorCtr="0">
+        <a:bodyPr spcFirstLastPara="0" vert="horz" wrap="square" lIns="142240" tIns="142240" rIns="142240" bIns="142240" numCol="1" spcCol="1270" anchor="ctr" anchorCtr="0">
           <a:noAutofit/>
         </a:bodyPr>
         <a:lstStyle/>
         <a:p>
-          <a:pPr lvl="0" algn="ctr" defTabSz="711200">
+          <a:pPr lvl="0" algn="ctr" defTabSz="889000">
             <a:lnSpc>
               <a:spcPct val="90000"/>
             </a:lnSpc>
@@ -3400,10 +3400,10 @@
             </a:spcAft>
           </a:pPr>
           <a:r>
-            <a:rPr lang="en-IN" sz="1600" b="1" kern="1200" dirty="0" smtClean="0"/>
+            <a:rPr lang="en-IN" sz="2000" b="1" kern="1200" dirty="0" smtClean="0"/>
             <a:t>Initialize SPI</a:t>
           </a:r>
-          <a:endParaRPr lang="en-IN" sz="1600" b="1" kern="1200" dirty="0"/>
+          <a:endParaRPr lang="en-IN" sz="2000" b="1" kern="1200" dirty="0"/>
         </a:p>
       </dsp:txBody>
       <dsp:txXfrm>
@@ -3539,12 +3539,12 @@
         </a:fontRef>
       </dsp:style>
       <dsp:txBody>
-        <a:bodyPr spcFirstLastPara="0" vert="horz" wrap="square" lIns="113792" tIns="113792" rIns="113792" bIns="113792" numCol="1" spcCol="1270" anchor="ctr" anchorCtr="0">
+        <a:bodyPr spcFirstLastPara="0" vert="horz" wrap="square" lIns="142240" tIns="142240" rIns="142240" bIns="142240" numCol="1" spcCol="1270" anchor="ctr" anchorCtr="0">
           <a:noAutofit/>
         </a:bodyPr>
         <a:lstStyle/>
         <a:p>
-          <a:pPr lvl="0" algn="ctr" defTabSz="711200">
+          <a:pPr lvl="0" algn="ctr" defTabSz="889000">
             <a:lnSpc>
               <a:spcPct val="90000"/>
             </a:lnSpc>
@@ -3556,10 +3556,10 @@
             </a:spcAft>
           </a:pPr>
           <a:r>
-            <a:rPr lang="en-IN" sz="1600" b="1" kern="1200" dirty="0" smtClean="0"/>
+            <a:rPr lang="en-IN" sz="2000" b="1" kern="1200" dirty="0" smtClean="0"/>
             <a:t>Initialize UART</a:t>
           </a:r>
-          <a:endParaRPr lang="en-IN" sz="1600" b="1" kern="1200" dirty="0"/>
+          <a:endParaRPr lang="en-IN" sz="2000" b="1" kern="1200" dirty="0"/>
         </a:p>
       </dsp:txBody>
       <dsp:txXfrm>
@@ -3701,12 +3701,12 @@
         </a:fontRef>
       </dsp:style>
       <dsp:txBody>
-        <a:bodyPr spcFirstLastPara="0" vert="horz" wrap="square" lIns="113792" tIns="113792" rIns="113792" bIns="113792" numCol="1" spcCol="1270" anchor="ctr" anchorCtr="0">
+        <a:bodyPr spcFirstLastPara="0" vert="horz" wrap="square" lIns="142240" tIns="142240" rIns="142240" bIns="142240" numCol="1" spcCol="1270" anchor="ctr" anchorCtr="0">
           <a:noAutofit/>
         </a:bodyPr>
         <a:lstStyle/>
         <a:p>
-          <a:pPr lvl="0" algn="ctr" defTabSz="711200">
+          <a:pPr lvl="0" algn="ctr" defTabSz="889000">
             <a:lnSpc>
               <a:spcPct val="90000"/>
             </a:lnSpc>
@@ -3718,10 +3718,10 @@
             </a:spcAft>
           </a:pPr>
           <a:r>
-            <a:rPr lang="en-IN" sz="1600" b="1" kern="1200" dirty="0" smtClean="0"/>
+            <a:rPr lang="en-IN" sz="2000" b="1" kern="1200" dirty="0" smtClean="0"/>
             <a:t>Initialize Timer</a:t>
           </a:r>
-          <a:endParaRPr lang="en-IN" sz="1600" b="1" kern="1200" dirty="0"/>
+          <a:endParaRPr lang="en-IN" sz="2000" b="1" kern="1200" dirty="0"/>
         </a:p>
       </dsp:txBody>
       <dsp:txXfrm>
@@ -3857,12 +3857,12 @@
         </a:fontRef>
       </dsp:style>
       <dsp:txBody>
-        <a:bodyPr spcFirstLastPara="0" vert="horz" wrap="square" lIns="113792" tIns="113792" rIns="113792" bIns="113792" numCol="1" spcCol="1270" anchor="ctr" anchorCtr="0">
+        <a:bodyPr spcFirstLastPara="0" vert="horz" wrap="square" lIns="142240" tIns="142240" rIns="142240" bIns="142240" numCol="1" spcCol="1270" anchor="ctr" anchorCtr="0">
           <a:noAutofit/>
         </a:bodyPr>
         <a:lstStyle/>
         <a:p>
-          <a:pPr lvl="0" algn="ctr" defTabSz="711200">
+          <a:pPr lvl="0" algn="ctr" defTabSz="889000">
             <a:lnSpc>
               <a:spcPct val="90000"/>
             </a:lnSpc>
@@ -3874,10 +3874,10 @@
             </a:spcAft>
           </a:pPr>
           <a:r>
-            <a:rPr lang="en-IN" sz="1600" b="1" kern="1200" dirty="0" smtClean="0"/>
+            <a:rPr lang="en-IN" sz="2000" b="1" kern="1200" dirty="0" smtClean="0"/>
             <a:t>Initialize ADC</a:t>
           </a:r>
-          <a:endParaRPr lang="en-IN" sz="1600" b="1" kern="1200" dirty="0"/>
+          <a:endParaRPr lang="en-IN" sz="2000" b="1" kern="1200" dirty="0"/>
         </a:p>
       </dsp:txBody>
       <dsp:txXfrm>
@@ -4013,12 +4013,12 @@
         </a:fontRef>
       </dsp:style>
       <dsp:txBody>
-        <a:bodyPr spcFirstLastPara="0" vert="horz" wrap="square" lIns="113792" tIns="113792" rIns="113792" bIns="113792" numCol="1" spcCol="1270" anchor="ctr" anchorCtr="0">
+        <a:bodyPr spcFirstLastPara="0" vert="horz" wrap="square" lIns="142240" tIns="142240" rIns="142240" bIns="142240" numCol="1" spcCol="1270" anchor="ctr" anchorCtr="0">
           <a:noAutofit/>
         </a:bodyPr>
         <a:lstStyle/>
         <a:p>
-          <a:pPr lvl="0" algn="ctr" defTabSz="711200">
+          <a:pPr lvl="0" algn="ctr" defTabSz="889000">
             <a:lnSpc>
               <a:spcPct val="90000"/>
             </a:lnSpc>
@@ -4030,10 +4030,10 @@
             </a:spcAft>
           </a:pPr>
           <a:r>
-            <a:rPr lang="en-IN" sz="1600" b="1" kern="1200" dirty="0" smtClean="0"/>
+            <a:rPr lang="en-IN" sz="2000" b="1" kern="1200" dirty="0" smtClean="0"/>
             <a:t>Initialize LCD</a:t>
           </a:r>
-          <a:endParaRPr lang="en-IN" sz="1600" b="1" kern="1200" dirty="0"/>
+          <a:endParaRPr lang="en-IN" sz="2000" b="1" kern="1200" dirty="0"/>
         </a:p>
       </dsp:txBody>
       <dsp:txXfrm>
@@ -4169,12 +4169,12 @@
         </a:fontRef>
       </dsp:style>
       <dsp:txBody>
-        <a:bodyPr spcFirstLastPara="0" vert="horz" wrap="square" lIns="113792" tIns="113792" rIns="113792" bIns="113792" numCol="1" spcCol="1270" anchor="ctr" anchorCtr="0">
+        <a:bodyPr spcFirstLastPara="0" vert="horz" wrap="square" lIns="142240" tIns="142240" rIns="142240" bIns="142240" numCol="1" spcCol="1270" anchor="ctr" anchorCtr="0">
           <a:noAutofit/>
         </a:bodyPr>
         <a:lstStyle/>
         <a:p>
-          <a:pPr lvl="0" algn="ctr" defTabSz="711200">
+          <a:pPr lvl="0" algn="ctr" defTabSz="889000">
             <a:lnSpc>
               <a:spcPct val="90000"/>
             </a:lnSpc>
@@ -4186,10 +4186,10 @@
             </a:spcAft>
           </a:pPr>
           <a:r>
-            <a:rPr lang="en-IN" sz="1600" b="1" kern="1200" dirty="0" smtClean="0"/>
+            <a:rPr lang="en-IN" sz="2000" b="1" kern="1200" dirty="0" smtClean="0"/>
             <a:t>Initialize Gyro</a:t>
           </a:r>
-          <a:endParaRPr lang="en-IN" sz="1600" b="1" kern="1200" dirty="0"/>
+          <a:endParaRPr lang="en-IN" sz="2000" b="1" kern="1200" dirty="0"/>
         </a:p>
       </dsp:txBody>
       <dsp:txXfrm>
@@ -4325,12 +4325,12 @@
         </a:fontRef>
       </dsp:style>
       <dsp:txBody>
-        <a:bodyPr spcFirstLastPara="0" vert="horz" wrap="square" lIns="113792" tIns="113792" rIns="113792" bIns="113792" numCol="1" spcCol="1270" anchor="ctr" anchorCtr="0">
+        <a:bodyPr spcFirstLastPara="0" vert="horz" wrap="square" lIns="142240" tIns="142240" rIns="142240" bIns="142240" numCol="1" spcCol="1270" anchor="ctr" anchorCtr="0">
           <a:noAutofit/>
         </a:bodyPr>
         <a:lstStyle/>
         <a:p>
-          <a:pPr lvl="0" algn="ctr" defTabSz="711200">
+          <a:pPr lvl="0" algn="ctr" defTabSz="889000">
             <a:lnSpc>
               <a:spcPct val="90000"/>
             </a:lnSpc>
@@ -4342,10 +4342,10 @@
             </a:spcAft>
           </a:pPr>
           <a:r>
-            <a:rPr lang="en-IN" sz="1600" b="1" kern="1200" dirty="0" smtClean="0"/>
+            <a:rPr lang="en-IN" sz="2000" b="1" kern="1200" dirty="0" smtClean="0"/>
             <a:t>Request Phone Number</a:t>
           </a:r>
-          <a:endParaRPr lang="en-IN" sz="1600" b="1" kern="1200" dirty="0"/>
+          <a:endParaRPr lang="en-IN" sz="2000" b="1" kern="1200" dirty="0"/>
         </a:p>
       </dsp:txBody>
       <dsp:txXfrm>
@@ -4402,12 +4402,12 @@
         </a:fontRef>
       </dsp:style>
       <dsp:txBody>
-        <a:bodyPr spcFirstLastPara="0" vert="horz" wrap="square" lIns="113792" tIns="113792" rIns="113792" bIns="113792" numCol="1" spcCol="1270" anchor="ctr" anchorCtr="0">
+        <a:bodyPr spcFirstLastPara="0" vert="horz" wrap="square" lIns="142240" tIns="142240" rIns="142240" bIns="142240" numCol="1" spcCol="1270" anchor="ctr" anchorCtr="0">
           <a:noAutofit/>
         </a:bodyPr>
         <a:lstStyle/>
         <a:p>
-          <a:pPr lvl="0" algn="ctr" defTabSz="711200">
+          <a:pPr lvl="0" algn="ctr" defTabSz="889000">
             <a:lnSpc>
               <a:spcPct val="90000"/>
             </a:lnSpc>
@@ -4419,10 +4419,10 @@
             </a:spcAft>
           </a:pPr>
           <a:r>
-            <a:rPr lang="en-IN" sz="1600" b="1" kern="1200" dirty="0" smtClean="0"/>
+            <a:rPr lang="en-IN" sz="2000" b="1" kern="1200" dirty="0" smtClean="0"/>
             <a:t>Initialize FONA</a:t>
           </a:r>
-          <a:endParaRPr lang="en-IN" sz="1600" b="1" kern="1200" dirty="0"/>
+          <a:endParaRPr lang="en-IN" sz="2000" b="1" kern="1200" dirty="0"/>
         </a:p>
       </dsp:txBody>
       <dsp:txXfrm>
@@ -7803,7 +7803,7 @@
           <a:noFill/>
           <a:extLst>
             <a:ext uri="{909E8E84-426E-40dd-AFC4-6F175D3DCCD1}">
-              <a14:hiddenFill xmlns:a14="http://schemas.microsoft.com/office/drawing/2010/main" xmlns="">
+              <a14:hiddenFill xmlns="" xmlns:a14="http://schemas.microsoft.com/office/drawing/2010/main">
                 <a:solidFill>
                   <a:srgbClr val="FFFFFF"/>
                 </a:solidFill>
@@ -7863,7 +7863,7 @@
             </a:ln>
             <a:extLst>
               <a:ext uri="{91240B29-F687-4f45-9708-019B960494DF}">
-                <a14:hiddenLine xmlns:a14="http://schemas.microsoft.com/office/drawing/2010/main" xmlns="" w="9525">
+                <a14:hiddenLine xmlns="" xmlns:a14="http://schemas.microsoft.com/office/drawing/2010/main" w="9525">
                   <a:solidFill>
                     <a:srgbClr val="000000"/>
                   </a:solidFill>
@@ -7953,7 +7953,7 @@
             </a:ln>
             <a:extLst>
               <a:ext uri="{91240B29-F687-4f45-9708-019B960494DF}">
-                <a14:hiddenLine xmlns:a14="http://schemas.microsoft.com/office/drawing/2010/main" xmlns="" w="9525">
+                <a14:hiddenLine xmlns="" xmlns:a14="http://schemas.microsoft.com/office/drawing/2010/main" w="9525">
                   <a:solidFill>
                     <a:srgbClr val="000000"/>
                   </a:solidFill>
@@ -8043,7 +8043,7 @@
             </a:ln>
             <a:extLst>
               <a:ext uri="{91240B29-F687-4f45-9708-019B960494DF}">
-                <a14:hiddenLine xmlns:a14="http://schemas.microsoft.com/office/drawing/2010/main" xmlns="" w="9525">
+                <a14:hiddenLine xmlns="" xmlns:a14="http://schemas.microsoft.com/office/drawing/2010/main" w="9525">
                   <a:solidFill>
                     <a:srgbClr val="000000"/>
                   </a:solidFill>
@@ -8077,7 +8077,7 @@
             </a:ln>
             <a:extLst>
               <a:ext uri="{91240B29-F687-4f45-9708-019B960494DF}">
-                <a14:hiddenLine xmlns:a14="http://schemas.microsoft.com/office/drawing/2010/main" xmlns="" w="9525">
+                <a14:hiddenLine xmlns="" xmlns:a14="http://schemas.microsoft.com/office/drawing/2010/main" w="9525">
                   <a:solidFill>
                     <a:srgbClr val="000000"/>
                   </a:solidFill>
@@ -8167,7 +8167,7 @@
             </a:ln>
             <a:extLst>
               <a:ext uri="{91240B29-F687-4f45-9708-019B960494DF}">
-                <a14:hiddenLine xmlns:a14="http://schemas.microsoft.com/office/drawing/2010/main" xmlns="" w="9525">
+                <a14:hiddenLine xmlns="" xmlns:a14="http://schemas.microsoft.com/office/drawing/2010/main" w="9525">
                   <a:solidFill>
                     <a:srgbClr val="000000"/>
                   </a:solidFill>
@@ -8229,7 +8229,7 @@
             </a:ln>
             <a:extLst>
               <a:ext uri="{91240B29-F687-4f45-9708-019B960494DF}">
-                <a14:hiddenLine xmlns:a14="http://schemas.microsoft.com/office/drawing/2010/main" xmlns="" w="9525">
+                <a14:hiddenLine xmlns="" xmlns:a14="http://schemas.microsoft.com/office/drawing/2010/main" w="9525">
                   <a:solidFill>
                     <a:srgbClr val="000000"/>
                   </a:solidFill>
@@ -8291,7 +8291,7 @@
             </a:ln>
             <a:extLst>
               <a:ext uri="{91240B29-F687-4f45-9708-019B960494DF}">
-                <a14:hiddenLine xmlns:a14="http://schemas.microsoft.com/office/drawing/2010/main" xmlns="" w="9525">
+                <a14:hiddenLine xmlns="" xmlns:a14="http://schemas.microsoft.com/office/drawing/2010/main" w="9525">
                   <a:solidFill>
                     <a:srgbClr val="000000"/>
                   </a:solidFill>
@@ -8381,7 +8381,7 @@
             </a:ln>
             <a:extLst>
               <a:ext uri="{91240B29-F687-4f45-9708-019B960494DF}">
-                <a14:hiddenLine xmlns:a14="http://schemas.microsoft.com/office/drawing/2010/main" xmlns="" w="9525">
+                <a14:hiddenLine xmlns="" xmlns:a14="http://schemas.microsoft.com/office/drawing/2010/main" w="9525">
                   <a:solidFill>
                     <a:srgbClr val="000000"/>
                   </a:solidFill>
@@ -8443,7 +8443,7 @@
             </a:ln>
             <a:extLst>
               <a:ext uri="{91240B29-F687-4f45-9708-019B960494DF}">
-                <a14:hiddenLine xmlns:a14="http://schemas.microsoft.com/office/drawing/2010/main" xmlns="" w="9525">
+                <a14:hiddenLine xmlns="" xmlns:a14="http://schemas.microsoft.com/office/drawing/2010/main" w="9525">
                   <a:solidFill>
                     <a:srgbClr val="000000"/>
                   </a:solidFill>
@@ -8505,7 +8505,7 @@
             </a:ln>
             <a:extLst>
               <a:ext uri="{91240B29-F687-4f45-9708-019B960494DF}">
-                <a14:hiddenLine xmlns:a14="http://schemas.microsoft.com/office/drawing/2010/main" xmlns="" w="9525">
+                <a14:hiddenLine xmlns="" xmlns:a14="http://schemas.microsoft.com/office/drawing/2010/main" w="9525">
                   <a:solidFill>
                     <a:srgbClr val="000000"/>
                   </a:solidFill>
@@ -8595,7 +8595,7 @@
             </a:ln>
             <a:extLst>
               <a:ext uri="{91240B29-F687-4f45-9708-019B960494DF}">
-                <a14:hiddenLine xmlns:a14="http://schemas.microsoft.com/office/drawing/2010/main" xmlns="" w="9525">
+                <a14:hiddenLine xmlns="" xmlns:a14="http://schemas.microsoft.com/office/drawing/2010/main" w="9525">
                   <a:solidFill>
                     <a:srgbClr val="000000"/>
                   </a:solidFill>
@@ -8685,7 +8685,7 @@
             </a:ln>
             <a:extLst>
               <a:ext uri="{91240B29-F687-4f45-9708-019B960494DF}">
-                <a14:hiddenLine xmlns:a14="http://schemas.microsoft.com/office/drawing/2010/main" xmlns="" w="9525">
+                <a14:hiddenLine xmlns="" xmlns:a14="http://schemas.microsoft.com/office/drawing/2010/main" w="9525">
                   <a:solidFill>
                     <a:srgbClr val="000000"/>
                   </a:solidFill>
@@ -8747,7 +8747,7 @@
             </a:ln>
             <a:extLst>
               <a:ext uri="{91240B29-F687-4f45-9708-019B960494DF}">
-                <a14:hiddenLine xmlns:a14="http://schemas.microsoft.com/office/drawing/2010/main" xmlns="" w="9525">
+                <a14:hiddenLine xmlns="" xmlns:a14="http://schemas.microsoft.com/office/drawing/2010/main" w="9525">
                   <a:solidFill>
                     <a:srgbClr val="000000"/>
                   </a:solidFill>
@@ -8857,7 +8857,7 @@
             </a:ln>
             <a:extLst>
               <a:ext uri="{91240B29-F687-4f45-9708-019B960494DF}">
-                <a14:hiddenLine xmlns:a14="http://schemas.microsoft.com/office/drawing/2010/main" xmlns="" w="9525">
+                <a14:hiddenLine xmlns="" xmlns:a14="http://schemas.microsoft.com/office/drawing/2010/main" w="9525">
                   <a:solidFill>
                     <a:srgbClr val="000000"/>
                   </a:solidFill>
@@ -8919,7 +8919,7 @@
             </a:ln>
             <a:extLst>
               <a:ext uri="{91240B29-F687-4f45-9708-019B960494DF}">
-                <a14:hiddenLine xmlns:a14="http://schemas.microsoft.com/office/drawing/2010/main" xmlns="" w="9525">
+                <a14:hiddenLine xmlns="" xmlns:a14="http://schemas.microsoft.com/office/drawing/2010/main" w="9525">
                   <a:solidFill>
                     <a:srgbClr val="000000"/>
                   </a:solidFill>
@@ -9009,7 +9009,7 @@
             </a:ln>
             <a:extLst>
               <a:ext uri="{91240B29-F687-4f45-9708-019B960494DF}">
-                <a14:hiddenLine xmlns:a14="http://schemas.microsoft.com/office/drawing/2010/main" xmlns="" w="9525">
+                <a14:hiddenLine xmlns="" xmlns:a14="http://schemas.microsoft.com/office/drawing/2010/main" w="9525">
                   <a:solidFill>
                     <a:srgbClr val="000000"/>
                   </a:solidFill>
@@ -9099,7 +9099,7 @@
             </a:ln>
             <a:extLst>
               <a:ext uri="{91240B29-F687-4f45-9708-019B960494DF}">
-                <a14:hiddenLine xmlns:a14="http://schemas.microsoft.com/office/drawing/2010/main" xmlns="" w="9525">
+                <a14:hiddenLine xmlns="" xmlns:a14="http://schemas.microsoft.com/office/drawing/2010/main" w="9525">
                   <a:solidFill>
                     <a:srgbClr val="000000"/>
                   </a:solidFill>
@@ -9161,7 +9161,7 @@
             </a:ln>
             <a:extLst>
               <a:ext uri="{91240B29-F687-4f45-9708-019B960494DF}">
-                <a14:hiddenLine xmlns:a14="http://schemas.microsoft.com/office/drawing/2010/main" xmlns="" w="9525">
+                <a14:hiddenLine xmlns="" xmlns:a14="http://schemas.microsoft.com/office/drawing/2010/main" w="9525">
                   <a:solidFill>
                     <a:srgbClr val="000000"/>
                   </a:solidFill>
@@ -9251,7 +9251,7 @@
             </a:ln>
             <a:extLst>
               <a:ext uri="{91240B29-F687-4f45-9708-019B960494DF}">
-                <a14:hiddenLine xmlns:a14="http://schemas.microsoft.com/office/drawing/2010/main" xmlns="" w="9525">
+                <a14:hiddenLine xmlns="" xmlns:a14="http://schemas.microsoft.com/office/drawing/2010/main" w="9525">
                   <a:solidFill>
                     <a:srgbClr val="000000"/>
                   </a:solidFill>
@@ -9341,7 +9341,7 @@
             </a:ln>
             <a:extLst>
               <a:ext uri="{91240B29-F687-4f45-9708-019B960494DF}">
-                <a14:hiddenLine xmlns:a14="http://schemas.microsoft.com/office/drawing/2010/main" xmlns="" w="9525">
+                <a14:hiddenLine xmlns="" xmlns:a14="http://schemas.microsoft.com/office/drawing/2010/main" w="9525">
                   <a:solidFill>
                     <a:srgbClr val="000000"/>
                   </a:solidFill>
@@ -9397,7 +9397,7 @@
             </a:ln>
             <a:extLst>
               <a:ext uri="{91240B29-F687-4f45-9708-019B960494DF}">
-                <a14:hiddenLine xmlns:a14="http://schemas.microsoft.com/office/drawing/2010/main" xmlns="" w="9525">
+                <a14:hiddenLine xmlns="" xmlns:a14="http://schemas.microsoft.com/office/drawing/2010/main" w="9525">
                   <a:solidFill>
                     <a:srgbClr val="000000"/>
                   </a:solidFill>
@@ -9487,7 +9487,7 @@
             </a:ln>
             <a:extLst>
               <a:ext uri="{91240B29-F687-4f45-9708-019B960494DF}">
-                <a14:hiddenLine xmlns:a14="http://schemas.microsoft.com/office/drawing/2010/main" xmlns="" w="9525">
+                <a14:hiddenLine xmlns="" xmlns:a14="http://schemas.microsoft.com/office/drawing/2010/main" w="9525">
                   <a:solidFill>
                     <a:srgbClr val="000000"/>
                   </a:solidFill>
@@ -9543,7 +9543,7 @@
             </a:ln>
             <a:extLst>
               <a:ext uri="{91240B29-F687-4f45-9708-019B960494DF}">
-                <a14:hiddenLine xmlns:a14="http://schemas.microsoft.com/office/drawing/2010/main" xmlns="" w="9525">
+                <a14:hiddenLine xmlns="" xmlns:a14="http://schemas.microsoft.com/office/drawing/2010/main" w="9525">
                   <a:solidFill>
                     <a:srgbClr val="000000"/>
                   </a:solidFill>
@@ -9633,7 +9633,7 @@
             </a:ln>
             <a:extLst>
               <a:ext uri="{91240B29-F687-4f45-9708-019B960494DF}">
-                <a14:hiddenLine xmlns:a14="http://schemas.microsoft.com/office/drawing/2010/main" xmlns="" w="9525">
+                <a14:hiddenLine xmlns="" xmlns:a14="http://schemas.microsoft.com/office/drawing/2010/main" w="9525">
                   <a:solidFill>
                     <a:srgbClr val="000000"/>
                   </a:solidFill>
@@ -9701,7 +9701,7 @@
             </a:ln>
             <a:extLst>
               <a:ext uri="{91240B29-F687-4f45-9708-019B960494DF}">
-                <a14:hiddenLine xmlns:a14="http://schemas.microsoft.com/office/drawing/2010/main" xmlns="" w="9525">
+                <a14:hiddenLine xmlns="" xmlns:a14="http://schemas.microsoft.com/office/drawing/2010/main" w="9525">
                   <a:solidFill>
                     <a:srgbClr val="000000"/>
                   </a:solidFill>
@@ -9791,7 +9791,7 @@
             </a:ln>
             <a:extLst>
               <a:ext uri="{91240B29-F687-4f45-9708-019B960494DF}">
-                <a14:hiddenLine xmlns:a14="http://schemas.microsoft.com/office/drawing/2010/main" xmlns="" w="9525">
+                <a14:hiddenLine xmlns="" xmlns:a14="http://schemas.microsoft.com/office/drawing/2010/main" w="9525">
                   <a:solidFill>
                     <a:srgbClr val="000000"/>
                   </a:solidFill>
@@ -9859,7 +9859,7 @@
             </a:ln>
             <a:extLst>
               <a:ext uri="{91240B29-F687-4f45-9708-019B960494DF}">
-                <a14:hiddenLine xmlns:a14="http://schemas.microsoft.com/office/drawing/2010/main" xmlns="" w="9525">
+                <a14:hiddenLine xmlns="" xmlns:a14="http://schemas.microsoft.com/office/drawing/2010/main" w="9525">
                   <a:solidFill>
                     <a:srgbClr val="000000"/>
                   </a:solidFill>
@@ -9949,7 +9949,7 @@
             </a:ln>
             <a:extLst>
               <a:ext uri="{91240B29-F687-4f45-9708-019B960494DF}">
-                <a14:hiddenLine xmlns:a14="http://schemas.microsoft.com/office/drawing/2010/main" xmlns="" w="9525">
+                <a14:hiddenLine xmlns="" xmlns:a14="http://schemas.microsoft.com/office/drawing/2010/main" w="9525">
                   <a:solidFill>
                     <a:srgbClr val="000000"/>
                   </a:solidFill>
@@ -9983,7 +9983,7 @@
             </a:ln>
             <a:extLst>
               <a:ext uri="{91240B29-F687-4f45-9708-019B960494DF}">
-                <a14:hiddenLine xmlns:a14="http://schemas.microsoft.com/office/drawing/2010/main" xmlns="" w="9525">
+                <a14:hiddenLine xmlns="" xmlns:a14="http://schemas.microsoft.com/office/drawing/2010/main" w="9525">
                   <a:solidFill>
                     <a:srgbClr val="000000"/>
                   </a:solidFill>
@@ -10073,7 +10073,7 @@
             </a:ln>
             <a:extLst>
               <a:ext uri="{91240B29-F687-4f45-9708-019B960494DF}">
-                <a14:hiddenLine xmlns:a14="http://schemas.microsoft.com/office/drawing/2010/main" xmlns="" w="9525">
+                <a14:hiddenLine xmlns="" xmlns:a14="http://schemas.microsoft.com/office/drawing/2010/main" w="9525">
                   <a:solidFill>
                     <a:srgbClr val="000000"/>
                   </a:solidFill>
@@ -10135,7 +10135,7 @@
             </a:ln>
             <a:extLst>
               <a:ext uri="{91240B29-F687-4f45-9708-019B960494DF}">
-                <a14:hiddenLine xmlns:a14="http://schemas.microsoft.com/office/drawing/2010/main" xmlns="" w="9525">
+                <a14:hiddenLine xmlns="" xmlns:a14="http://schemas.microsoft.com/office/drawing/2010/main" w="9525">
                   <a:solidFill>
                     <a:srgbClr val="000000"/>
                   </a:solidFill>
@@ -10197,7 +10197,7 @@
             </a:ln>
             <a:extLst>
               <a:ext uri="{91240B29-F687-4f45-9708-019B960494DF}">
-                <a14:hiddenLine xmlns:a14="http://schemas.microsoft.com/office/drawing/2010/main" xmlns="" w="9525">
+                <a14:hiddenLine xmlns="" xmlns:a14="http://schemas.microsoft.com/office/drawing/2010/main" w="9525">
                   <a:solidFill>
                     <a:srgbClr val="000000"/>
                   </a:solidFill>
@@ -10287,7 +10287,7 @@
             </a:ln>
             <a:extLst>
               <a:ext uri="{91240B29-F687-4f45-9708-019B960494DF}">
-                <a14:hiddenLine xmlns:a14="http://schemas.microsoft.com/office/drawing/2010/main" xmlns="" w="9525">
+                <a14:hiddenLine xmlns="" xmlns:a14="http://schemas.microsoft.com/office/drawing/2010/main" w="9525">
                   <a:solidFill>
                     <a:srgbClr val="000000"/>
                   </a:solidFill>
@@ -10355,7 +10355,7 @@
             </a:ln>
             <a:extLst>
               <a:ext uri="{91240B29-F687-4f45-9708-019B960494DF}">
-                <a14:hiddenLine xmlns:a14="http://schemas.microsoft.com/office/drawing/2010/main" xmlns="" w="9525">
+                <a14:hiddenLine xmlns="" xmlns:a14="http://schemas.microsoft.com/office/drawing/2010/main" w="9525">
                   <a:solidFill>
                     <a:srgbClr val="000000"/>
                   </a:solidFill>
@@ -10417,7 +10417,7 @@
             </a:ln>
             <a:extLst>
               <a:ext uri="{91240B29-F687-4f45-9708-019B960494DF}">
-                <a14:hiddenLine xmlns:a14="http://schemas.microsoft.com/office/drawing/2010/main" xmlns="" w="9525">
+                <a14:hiddenLine xmlns="" xmlns:a14="http://schemas.microsoft.com/office/drawing/2010/main" w="9525">
                   <a:solidFill>
                     <a:srgbClr val="000000"/>
                   </a:solidFill>
@@ -10507,7 +10507,7 @@
             </a:ln>
             <a:extLst>
               <a:ext uri="{91240B29-F687-4f45-9708-019B960494DF}">
-                <a14:hiddenLine xmlns:a14="http://schemas.microsoft.com/office/drawing/2010/main" xmlns="" w="9525">
+                <a14:hiddenLine xmlns="" xmlns:a14="http://schemas.microsoft.com/office/drawing/2010/main" w="9525">
                   <a:solidFill>
                     <a:srgbClr val="000000"/>
                   </a:solidFill>
@@ -10569,7 +10569,7 @@
             </a:ln>
             <a:extLst>
               <a:ext uri="{91240B29-F687-4f45-9708-019B960494DF}">
-                <a14:hiddenLine xmlns:a14="http://schemas.microsoft.com/office/drawing/2010/main" xmlns="" w="9525">
+                <a14:hiddenLine xmlns="" xmlns:a14="http://schemas.microsoft.com/office/drawing/2010/main" w="9525">
                   <a:solidFill>
                     <a:srgbClr val="000000"/>
                   </a:solidFill>
@@ -10659,7 +10659,7 @@
             </a:ln>
             <a:extLst>
               <a:ext uri="{91240B29-F687-4f45-9708-019B960494DF}">
-                <a14:hiddenLine xmlns:a14="http://schemas.microsoft.com/office/drawing/2010/main" xmlns="" w="9525">
+                <a14:hiddenLine xmlns="" xmlns:a14="http://schemas.microsoft.com/office/drawing/2010/main" w="9525">
                   <a:solidFill>
                     <a:srgbClr val="000000"/>
                   </a:solidFill>
@@ -10721,7 +10721,7 @@
             </a:ln>
             <a:extLst>
               <a:ext uri="{91240B29-F687-4f45-9708-019B960494DF}">
-                <a14:hiddenLine xmlns:a14="http://schemas.microsoft.com/office/drawing/2010/main" xmlns="" w="9525">
+                <a14:hiddenLine xmlns="" xmlns:a14="http://schemas.microsoft.com/office/drawing/2010/main" w="9525">
                   <a:solidFill>
                     <a:srgbClr val="000000"/>
                   </a:solidFill>
@@ -10811,7 +10811,7 @@
             </a:ln>
             <a:extLst>
               <a:ext uri="{91240B29-F687-4f45-9708-019B960494DF}">
-                <a14:hiddenLine xmlns:a14="http://schemas.microsoft.com/office/drawing/2010/main" xmlns="" w="9525">
+                <a14:hiddenLine xmlns="" xmlns:a14="http://schemas.microsoft.com/office/drawing/2010/main" w="9525">
                   <a:solidFill>
                     <a:srgbClr val="000000"/>
                   </a:solidFill>
@@ -10845,7 +10845,7 @@
             </a:ln>
             <a:extLst>
               <a:ext uri="{91240B29-F687-4f45-9708-019B960494DF}">
-                <a14:hiddenLine xmlns:a14="http://schemas.microsoft.com/office/drawing/2010/main" xmlns="" w="9525">
+                <a14:hiddenLine xmlns="" xmlns:a14="http://schemas.microsoft.com/office/drawing/2010/main" w="9525">
                   <a:solidFill>
                     <a:srgbClr val="000000"/>
                   </a:solidFill>
@@ -10910,7 +10910,7 @@
             </a:ln>
             <a:extLst>
               <a:ext uri="{91240B29-F687-4f45-9708-019B960494DF}">
-                <a14:hiddenLine xmlns:a14="http://schemas.microsoft.com/office/drawing/2010/main" xmlns="" w="9525">
+                <a14:hiddenLine xmlns="" xmlns:a14="http://schemas.microsoft.com/office/drawing/2010/main" w="9525">
                   <a:solidFill>
                     <a:srgbClr val="000000"/>
                   </a:solidFill>
@@ -11000,7 +11000,7 @@
             </a:ln>
             <a:extLst>
               <a:ext uri="{91240B29-F687-4f45-9708-019B960494DF}">
-                <a14:hiddenLine xmlns:a14="http://schemas.microsoft.com/office/drawing/2010/main" xmlns="" w="9525">
+                <a14:hiddenLine xmlns="" xmlns:a14="http://schemas.microsoft.com/office/drawing/2010/main" w="9525">
                   <a:solidFill>
                     <a:srgbClr val="000000"/>
                   </a:solidFill>
@@ -11062,7 +11062,7 @@
             </a:ln>
             <a:extLst>
               <a:ext uri="{91240B29-F687-4f45-9708-019B960494DF}">
-                <a14:hiddenLine xmlns:a14="http://schemas.microsoft.com/office/drawing/2010/main" xmlns="" w="9525">
+                <a14:hiddenLine xmlns="" xmlns:a14="http://schemas.microsoft.com/office/drawing/2010/main" w="9525">
                   <a:solidFill>
                     <a:srgbClr val="000000"/>
                   </a:solidFill>
@@ -11152,7 +11152,7 @@
             </a:ln>
             <a:extLst>
               <a:ext uri="{91240B29-F687-4f45-9708-019B960494DF}">
-                <a14:hiddenLine xmlns:a14="http://schemas.microsoft.com/office/drawing/2010/main" xmlns="" w="9525">
+                <a14:hiddenLine xmlns="" xmlns:a14="http://schemas.microsoft.com/office/drawing/2010/main" w="9525">
                   <a:solidFill>
                     <a:srgbClr val="000000"/>
                   </a:solidFill>
@@ -11242,7 +11242,7 @@
             </a:ln>
             <a:extLst>
               <a:ext uri="{91240B29-F687-4f45-9708-019B960494DF}">
-                <a14:hiddenLine xmlns:a14="http://schemas.microsoft.com/office/drawing/2010/main" xmlns="" w="9525">
+                <a14:hiddenLine xmlns="" xmlns:a14="http://schemas.microsoft.com/office/drawing/2010/main" w="9525">
                   <a:solidFill>
                     <a:srgbClr val="000000"/>
                   </a:solidFill>
@@ -11307,7 +11307,7 @@
             </a:ln>
             <a:extLst>
               <a:ext uri="{91240B29-F687-4f45-9708-019B960494DF}">
-                <a14:hiddenLine xmlns:a14="http://schemas.microsoft.com/office/drawing/2010/main" xmlns="" w="9525">
+                <a14:hiddenLine xmlns="" xmlns:a14="http://schemas.microsoft.com/office/drawing/2010/main" w="9525">
                   <a:solidFill>
                     <a:srgbClr val="000000"/>
                   </a:solidFill>
@@ -11369,7 +11369,7 @@
             </a:ln>
             <a:extLst>
               <a:ext uri="{91240B29-F687-4f45-9708-019B960494DF}">
-                <a14:hiddenLine xmlns:a14="http://schemas.microsoft.com/office/drawing/2010/main" xmlns="" w="9525">
+                <a14:hiddenLine xmlns="" xmlns:a14="http://schemas.microsoft.com/office/drawing/2010/main" w="9525">
                   <a:solidFill>
                     <a:srgbClr val="000000"/>
                   </a:solidFill>
@@ -11459,7 +11459,7 @@
             </a:ln>
             <a:extLst>
               <a:ext uri="{91240B29-F687-4f45-9708-019B960494DF}">
-                <a14:hiddenLine xmlns:a14="http://schemas.microsoft.com/office/drawing/2010/main" xmlns="" w="9525">
+                <a14:hiddenLine xmlns="" xmlns:a14="http://schemas.microsoft.com/office/drawing/2010/main" w="9525">
                   <a:solidFill>
                     <a:srgbClr val="000000"/>
                   </a:solidFill>
@@ -11549,7 +11549,7 @@
             </a:ln>
             <a:extLst>
               <a:ext uri="{91240B29-F687-4f45-9708-019B960494DF}">
-                <a14:hiddenLine xmlns:a14="http://schemas.microsoft.com/office/drawing/2010/main" xmlns="" w="9525">
+                <a14:hiddenLine xmlns="" xmlns:a14="http://schemas.microsoft.com/office/drawing/2010/main" w="9525">
                   <a:solidFill>
                     <a:srgbClr val="000000"/>
                   </a:solidFill>
@@ -11611,7 +11611,7 @@
             </a:ln>
             <a:extLst>
               <a:ext uri="{91240B29-F687-4f45-9708-019B960494DF}">
-                <a14:hiddenLine xmlns:a14="http://schemas.microsoft.com/office/drawing/2010/main" xmlns="" w="9525">
+                <a14:hiddenLine xmlns="" xmlns:a14="http://schemas.microsoft.com/office/drawing/2010/main" w="9525">
                   <a:solidFill>
                     <a:srgbClr val="000000"/>
                   </a:solidFill>
@@ -11731,7 +11731,7 @@
             </a:ln>
             <a:extLst>
               <a:ext uri="{91240B29-F687-4f45-9708-019B960494DF}">
-                <a14:hiddenLine xmlns:a14="http://schemas.microsoft.com/office/drawing/2010/main" xmlns="" w="9525">
+                <a14:hiddenLine xmlns="" xmlns:a14="http://schemas.microsoft.com/office/drawing/2010/main" w="9525">
                   <a:solidFill>
                     <a:srgbClr val="000000"/>
                   </a:solidFill>
@@ -11799,7 +11799,7 @@
             </a:ln>
             <a:extLst>
               <a:ext uri="{91240B29-F687-4f45-9708-019B960494DF}">
-                <a14:hiddenLine xmlns:a14="http://schemas.microsoft.com/office/drawing/2010/main" xmlns="" w="9525">
+                <a14:hiddenLine xmlns="" xmlns:a14="http://schemas.microsoft.com/office/drawing/2010/main" w="9525">
                   <a:solidFill>
                     <a:srgbClr val="000000"/>
                   </a:solidFill>
@@ -11889,7 +11889,7 @@
             </a:ln>
             <a:extLst>
               <a:ext uri="{91240B29-F687-4f45-9708-019B960494DF}">
-                <a14:hiddenLine xmlns:a14="http://schemas.microsoft.com/office/drawing/2010/main" xmlns="" w="9525">
+                <a14:hiddenLine xmlns="" xmlns:a14="http://schemas.microsoft.com/office/drawing/2010/main" w="9525">
                   <a:solidFill>
                     <a:srgbClr val="000000"/>
                   </a:solidFill>
@@ -12029,7 +12029,7 @@
           <a:p>
             <a:fld id="{48A87A34-81AB-432B-8DAE-1953F412C126}" type="datetimeFigureOut">
               <a:rPr lang="en-US" dirty="0"/>
-              <a:t>12/7/2015</a:t>
+              <a:t>12/8/2015</a:t>
             </a:fld>
             <a:endParaRPr lang="en-US" dirty="0"/>
           </a:p>
@@ -12291,7 +12291,7 @@
           <a:p>
             <a:fld id="{48A87A34-81AB-432B-8DAE-1953F412C126}" type="datetimeFigureOut">
               <a:rPr lang="en-US" dirty="0"/>
-              <a:t>12/7/2015</a:t>
+              <a:t>12/8/2015</a:t>
             </a:fld>
             <a:endParaRPr lang="en-US" dirty="0"/>
           </a:p>
@@ -12482,7 +12482,7 @@
           <a:p>
             <a:fld id="{48A87A34-81AB-432B-8DAE-1953F412C126}" type="datetimeFigureOut">
               <a:rPr lang="en-US" dirty="0"/>
-              <a:t>12/7/2015</a:t>
+              <a:t>12/8/2015</a:t>
             </a:fld>
             <a:endParaRPr lang="en-US" dirty="0"/>
           </a:p>
@@ -12740,7 +12740,7 @@
           <a:p>
             <a:fld id="{48A87A34-81AB-432B-8DAE-1953F412C126}" type="datetimeFigureOut">
               <a:rPr lang="en-US" dirty="0"/>
-              <a:t>12/7/2015</a:t>
+              <a:t>12/8/2015</a:t>
             </a:fld>
             <a:endParaRPr lang="en-US" dirty="0"/>
           </a:p>
@@ -13169,7 +13169,7 @@
           <a:p>
             <a:fld id="{48A87A34-81AB-432B-8DAE-1953F412C126}" type="datetimeFigureOut">
               <a:rPr lang="en-US" dirty="0"/>
-              <a:t>12/7/2015</a:t>
+              <a:t>12/8/2015</a:t>
             </a:fld>
             <a:endParaRPr lang="en-US" dirty="0"/>
           </a:p>
@@ -13710,7 +13710,7 @@
           <a:p>
             <a:fld id="{48A87A34-81AB-432B-8DAE-1953F412C126}" type="datetimeFigureOut">
               <a:rPr lang="en-US" dirty="0"/>
-              <a:t>12/7/2015</a:t>
+              <a:t>12/8/2015</a:t>
             </a:fld>
             <a:endParaRPr lang="en-US" dirty="0"/>
           </a:p>
@@ -14425,7 +14425,7 @@
           <a:p>
             <a:fld id="{48A87A34-81AB-432B-8DAE-1953F412C126}" type="datetimeFigureOut">
               <a:rPr lang="en-US" dirty="0"/>
-              <a:t>12/7/2015</a:t>
+              <a:t>12/8/2015</a:t>
             </a:fld>
             <a:endParaRPr lang="en-US" dirty="0"/>
           </a:p>
@@ -14590,7 +14590,7 @@
           <a:p>
             <a:fld id="{48A87A34-81AB-432B-8DAE-1953F412C126}" type="datetimeFigureOut">
               <a:rPr lang="en-US" dirty="0"/>
-              <a:t>12/7/2015</a:t>
+              <a:t>12/8/2015</a:t>
             </a:fld>
             <a:endParaRPr lang="en-US" dirty="0"/>
           </a:p>
@@ -14765,7 +14765,7 @@
           <a:p>
             <a:fld id="{48A87A34-81AB-432B-8DAE-1953F412C126}" type="datetimeFigureOut">
               <a:rPr lang="en-US" dirty="0"/>
-              <a:t>12/7/2015</a:t>
+              <a:t>12/8/2015</a:t>
             </a:fld>
             <a:endParaRPr lang="en-US" dirty="0"/>
           </a:p>
@@ -14930,7 +14930,7 @@
           <a:p>
             <a:fld id="{48A87A34-81AB-432B-8DAE-1953F412C126}" type="datetimeFigureOut">
               <a:rPr lang="en-US" dirty="0"/>
-              <a:t>12/7/2015</a:t>
+              <a:t>12/8/2015</a:t>
             </a:fld>
             <a:endParaRPr lang="en-US" dirty="0"/>
           </a:p>
@@ -15175,7 +15175,7 @@
           <a:p>
             <a:fld id="{48A87A34-81AB-432B-8DAE-1953F412C126}" type="datetimeFigureOut">
               <a:rPr lang="en-US" dirty="0"/>
-              <a:t>12/7/2015</a:t>
+              <a:t>12/8/2015</a:t>
             </a:fld>
             <a:endParaRPr lang="en-US" dirty="0"/>
           </a:p>
@@ -15402,7 +15402,7 @@
           <a:p>
             <a:fld id="{48A87A34-81AB-432B-8DAE-1953F412C126}" type="datetimeFigureOut">
               <a:rPr lang="en-US" dirty="0"/>
-              <a:t>12/7/2015</a:t>
+              <a:t>12/8/2015</a:t>
             </a:fld>
             <a:endParaRPr lang="en-US" dirty="0"/>
           </a:p>
@@ -15778,7 +15778,7 @@
           <a:p>
             <a:fld id="{48A87A34-81AB-432B-8DAE-1953F412C126}" type="datetimeFigureOut">
               <a:rPr lang="en-US" dirty="0"/>
-              <a:t>12/7/2015</a:t>
+              <a:t>12/8/2015</a:t>
             </a:fld>
             <a:endParaRPr lang="en-US" dirty="0"/>
           </a:p>
@@ -15891,7 +15891,7 @@
           <a:p>
             <a:fld id="{48A87A34-81AB-432B-8DAE-1953F412C126}" type="datetimeFigureOut">
               <a:rPr lang="en-US" dirty="0"/>
-              <a:t>12/7/2015</a:t>
+              <a:t>12/8/2015</a:t>
             </a:fld>
             <a:endParaRPr lang="en-US" dirty="0"/>
           </a:p>
@@ -15981,7 +15981,7 @@
           <a:p>
             <a:fld id="{48A87A34-81AB-432B-8DAE-1953F412C126}" type="datetimeFigureOut">
               <a:rPr lang="en-US" dirty="0"/>
-              <a:t>12/7/2015</a:t>
+              <a:t>12/8/2015</a:t>
             </a:fld>
             <a:endParaRPr lang="en-US" dirty="0"/>
           </a:p>
@@ -16225,7 +16225,7 @@
           <a:p>
             <a:fld id="{48A87A34-81AB-432B-8DAE-1953F412C126}" type="datetimeFigureOut">
               <a:rPr lang="en-US" dirty="0"/>
-              <a:t>12/7/2015</a:t>
+              <a:t>12/8/2015</a:t>
             </a:fld>
             <a:endParaRPr lang="en-US" dirty="0"/>
           </a:p>
@@ -16500,7 +16500,7 @@
           <a:p>
             <a:fld id="{48A87A34-81AB-432B-8DAE-1953F412C126}" type="datetimeFigureOut">
               <a:rPr lang="en-US" dirty="0"/>
-              <a:t>12/7/2015</a:t>
+              <a:t>12/8/2015</a:t>
             </a:fld>
             <a:endParaRPr lang="en-US" dirty="0"/>
           </a:p>
@@ -16611,7 +16611,7 @@
           <a:noFill/>
           <a:extLst>
             <a:ext uri="{909E8E84-426E-40dd-AFC4-6F175D3DCCD1}">
-              <a14:hiddenFill xmlns:a14="http://schemas.microsoft.com/office/drawing/2010/main" xmlns="">
+              <a14:hiddenFill xmlns="" xmlns:a14="http://schemas.microsoft.com/office/drawing/2010/main">
                 <a:solidFill>
                   <a:srgbClr val="FFFFFF"/>
                 </a:solidFill>
@@ -16685,7 +16685,7 @@
               </a:ln>
               <a:extLst>
                 <a:ext uri="{91240B29-F687-4f45-9708-019B960494DF}">
-                  <a14:hiddenLine xmlns:a14="http://schemas.microsoft.com/office/drawing/2010/main" xmlns="" w="9525">
+                  <a14:hiddenLine xmlns="" xmlns:a14="http://schemas.microsoft.com/office/drawing/2010/main" w="9525">
                     <a:solidFill>
                       <a:srgbClr val="000000"/>
                     </a:solidFill>
@@ -16775,7 +16775,7 @@
               </a:ln>
               <a:extLst>
                 <a:ext uri="{91240B29-F687-4f45-9708-019B960494DF}">
-                  <a14:hiddenLine xmlns:a14="http://schemas.microsoft.com/office/drawing/2010/main" xmlns="" w="9525">
+                  <a14:hiddenLine xmlns="" xmlns:a14="http://schemas.microsoft.com/office/drawing/2010/main" w="9525">
                     <a:solidFill>
                       <a:srgbClr val="000000"/>
                     </a:solidFill>
@@ -16865,7 +16865,7 @@
               </a:ln>
               <a:extLst>
                 <a:ext uri="{91240B29-F687-4f45-9708-019B960494DF}">
-                  <a14:hiddenLine xmlns:a14="http://schemas.microsoft.com/office/drawing/2010/main" xmlns="" w="9525">
+                  <a14:hiddenLine xmlns="" xmlns:a14="http://schemas.microsoft.com/office/drawing/2010/main" w="9525">
                     <a:solidFill>
                       <a:srgbClr val="000000"/>
                     </a:solidFill>
@@ -16927,7 +16927,7 @@
               </a:ln>
               <a:extLst>
                 <a:ext uri="{91240B29-F687-4f45-9708-019B960494DF}">
-                  <a14:hiddenLine xmlns:a14="http://schemas.microsoft.com/office/drawing/2010/main" xmlns="" w="9525">
+                  <a14:hiddenLine xmlns="" xmlns:a14="http://schemas.microsoft.com/office/drawing/2010/main" w="9525">
                     <a:solidFill>
                       <a:srgbClr val="000000"/>
                     </a:solidFill>
@@ -17017,7 +17017,7 @@
               </a:ln>
               <a:extLst>
                 <a:ext uri="{91240B29-F687-4f45-9708-019B960494DF}">
-                  <a14:hiddenLine xmlns:a14="http://schemas.microsoft.com/office/drawing/2010/main" xmlns="" w="9525">
+                  <a14:hiddenLine xmlns="" xmlns:a14="http://schemas.microsoft.com/office/drawing/2010/main" w="9525">
                     <a:solidFill>
                       <a:srgbClr val="000000"/>
                     </a:solidFill>
@@ -17079,7 +17079,7 @@
               </a:ln>
               <a:extLst>
                 <a:ext uri="{91240B29-F687-4f45-9708-019B960494DF}">
-                  <a14:hiddenLine xmlns:a14="http://schemas.microsoft.com/office/drawing/2010/main" xmlns="" w="9525">
+                  <a14:hiddenLine xmlns="" xmlns:a14="http://schemas.microsoft.com/office/drawing/2010/main" w="9525">
                     <a:solidFill>
                       <a:srgbClr val="000000"/>
                     </a:solidFill>
@@ -17141,7 +17141,7 @@
               </a:ln>
               <a:extLst>
                 <a:ext uri="{91240B29-F687-4f45-9708-019B960494DF}">
-                  <a14:hiddenLine xmlns:a14="http://schemas.microsoft.com/office/drawing/2010/main" xmlns="" w="9525">
+                  <a14:hiddenLine xmlns="" xmlns:a14="http://schemas.microsoft.com/office/drawing/2010/main" w="9525">
                     <a:solidFill>
                       <a:srgbClr val="000000"/>
                     </a:solidFill>
@@ -17231,7 +17231,7 @@
               </a:ln>
               <a:extLst>
                 <a:ext uri="{91240B29-F687-4f45-9708-019B960494DF}">
-                  <a14:hiddenLine xmlns:a14="http://schemas.microsoft.com/office/drawing/2010/main" xmlns="" w="9525">
+                  <a14:hiddenLine xmlns="" xmlns:a14="http://schemas.microsoft.com/office/drawing/2010/main" w="9525">
                     <a:solidFill>
                       <a:srgbClr val="000000"/>
                     </a:solidFill>
@@ -17321,7 +17321,7 @@
               </a:ln>
               <a:extLst>
                 <a:ext uri="{91240B29-F687-4f45-9708-019B960494DF}">
-                  <a14:hiddenLine xmlns:a14="http://schemas.microsoft.com/office/drawing/2010/main" xmlns="" w="9525">
+                  <a14:hiddenLine xmlns="" xmlns:a14="http://schemas.microsoft.com/office/drawing/2010/main" w="9525">
                     <a:solidFill>
                       <a:srgbClr val="000000"/>
                     </a:solidFill>
@@ -17383,7 +17383,7 @@
               </a:ln>
               <a:extLst>
                 <a:ext uri="{91240B29-F687-4f45-9708-019B960494DF}">
-                  <a14:hiddenLine xmlns:a14="http://schemas.microsoft.com/office/drawing/2010/main" xmlns="" w="9525">
+                  <a14:hiddenLine xmlns="" xmlns:a14="http://schemas.microsoft.com/office/drawing/2010/main" w="9525">
                     <a:solidFill>
                       <a:srgbClr val="000000"/>
                     </a:solidFill>
@@ -17493,7 +17493,7 @@
               </a:ln>
               <a:extLst>
                 <a:ext uri="{91240B29-F687-4f45-9708-019B960494DF}">
-                  <a14:hiddenLine xmlns:a14="http://schemas.microsoft.com/office/drawing/2010/main" xmlns="" w="9525">
+                  <a14:hiddenLine xmlns="" xmlns:a14="http://schemas.microsoft.com/office/drawing/2010/main" w="9525">
                     <a:solidFill>
                       <a:srgbClr val="000000"/>
                     </a:solidFill>
@@ -17577,7 +17577,7 @@
               </a:ln>
               <a:extLst>
                 <a:ext uri="{91240B29-F687-4f45-9708-019B960494DF}">
-                  <a14:hiddenLine xmlns:a14="http://schemas.microsoft.com/office/drawing/2010/main" xmlns="" w="9525">
+                  <a14:hiddenLine xmlns="" xmlns:a14="http://schemas.microsoft.com/office/drawing/2010/main" w="9525">
                     <a:solidFill>
                       <a:srgbClr val="000000"/>
                     </a:solidFill>
@@ -17639,7 +17639,7 @@
               </a:ln>
               <a:extLst>
                 <a:ext uri="{91240B29-F687-4f45-9708-019B960494DF}">
-                  <a14:hiddenLine xmlns:a14="http://schemas.microsoft.com/office/drawing/2010/main" xmlns="" w="9525">
+                  <a14:hiddenLine xmlns="" xmlns:a14="http://schemas.microsoft.com/office/drawing/2010/main" w="9525">
                     <a:solidFill>
                       <a:srgbClr val="000000"/>
                     </a:solidFill>
@@ -17701,7 +17701,7 @@
               </a:ln>
               <a:extLst>
                 <a:ext uri="{91240B29-F687-4f45-9708-019B960494DF}">
-                  <a14:hiddenLine xmlns:a14="http://schemas.microsoft.com/office/drawing/2010/main" xmlns="" w="9525">
+                  <a14:hiddenLine xmlns="" xmlns:a14="http://schemas.microsoft.com/office/drawing/2010/main" w="9525">
                     <a:solidFill>
                       <a:srgbClr val="000000"/>
                     </a:solidFill>
@@ -17791,7 +17791,7 @@
               </a:ln>
               <a:extLst>
                 <a:ext uri="{91240B29-F687-4f45-9708-019B960494DF}">
-                  <a14:hiddenLine xmlns:a14="http://schemas.microsoft.com/office/drawing/2010/main" xmlns="" w="9525">
+                  <a14:hiddenLine xmlns="" xmlns:a14="http://schemas.microsoft.com/office/drawing/2010/main" w="9525">
                     <a:solidFill>
                       <a:srgbClr val="000000"/>
                     </a:solidFill>
@@ -17825,7 +17825,7 @@
               </a:ln>
               <a:extLst>
                 <a:ext uri="{91240B29-F687-4f45-9708-019B960494DF}">
-                  <a14:hiddenLine xmlns:a14="http://schemas.microsoft.com/office/drawing/2010/main" xmlns="" w="9525">
+                  <a14:hiddenLine xmlns="" xmlns:a14="http://schemas.microsoft.com/office/drawing/2010/main" w="9525">
                     <a:solidFill>
                       <a:srgbClr val="000000"/>
                     </a:solidFill>
@@ -17890,7 +17890,7 @@
               </a:ln>
               <a:extLst>
                 <a:ext uri="{91240B29-F687-4f45-9708-019B960494DF}">
-                  <a14:hiddenLine xmlns:a14="http://schemas.microsoft.com/office/drawing/2010/main" xmlns="" w="9525">
+                  <a14:hiddenLine xmlns="" xmlns:a14="http://schemas.microsoft.com/office/drawing/2010/main" w="9525">
                     <a:solidFill>
                       <a:srgbClr val="000000"/>
                     </a:solidFill>
@@ -17980,7 +17980,7 @@
               </a:ln>
               <a:extLst>
                 <a:ext uri="{91240B29-F687-4f45-9708-019B960494DF}">
-                  <a14:hiddenLine xmlns:a14="http://schemas.microsoft.com/office/drawing/2010/main" xmlns="" w="9525">
+                  <a14:hiddenLine xmlns="" xmlns:a14="http://schemas.microsoft.com/office/drawing/2010/main" w="9525">
                     <a:solidFill>
                       <a:srgbClr val="000000"/>
                     </a:solidFill>
@@ -18042,7 +18042,7 @@
               </a:ln>
               <a:extLst>
                 <a:ext uri="{91240B29-F687-4f45-9708-019B960494DF}">
-                  <a14:hiddenLine xmlns:a14="http://schemas.microsoft.com/office/drawing/2010/main" xmlns="" w="9525">
+                  <a14:hiddenLine xmlns="" xmlns:a14="http://schemas.microsoft.com/office/drawing/2010/main" w="9525">
                     <a:solidFill>
                       <a:srgbClr val="000000"/>
                     </a:solidFill>
@@ -18132,7 +18132,7 @@
               </a:ln>
               <a:extLst>
                 <a:ext uri="{91240B29-F687-4f45-9708-019B960494DF}">
-                  <a14:hiddenLine xmlns:a14="http://schemas.microsoft.com/office/drawing/2010/main" xmlns="" w="9525">
+                  <a14:hiddenLine xmlns="" xmlns:a14="http://schemas.microsoft.com/office/drawing/2010/main" w="9525">
                     <a:solidFill>
                       <a:srgbClr val="000000"/>
                     </a:solidFill>
@@ -18197,7 +18197,7 @@
               </a:ln>
               <a:extLst>
                 <a:ext uri="{91240B29-F687-4f45-9708-019B960494DF}">
-                  <a14:hiddenLine xmlns:a14="http://schemas.microsoft.com/office/drawing/2010/main" xmlns="" w="9525">
+                  <a14:hiddenLine xmlns="" xmlns:a14="http://schemas.microsoft.com/office/drawing/2010/main" w="9525">
                     <a:solidFill>
                       <a:srgbClr val="000000"/>
                     </a:solidFill>
@@ -18259,7 +18259,7 @@
               </a:ln>
               <a:extLst>
                 <a:ext uri="{91240B29-F687-4f45-9708-019B960494DF}">
-                  <a14:hiddenLine xmlns:a14="http://schemas.microsoft.com/office/drawing/2010/main" xmlns="" w="9525">
+                  <a14:hiddenLine xmlns="" xmlns:a14="http://schemas.microsoft.com/office/drawing/2010/main" w="9525">
                     <a:solidFill>
                       <a:srgbClr val="000000"/>
                     </a:solidFill>
@@ -18349,7 +18349,7 @@
               </a:ln>
               <a:extLst>
                 <a:ext uri="{91240B29-F687-4f45-9708-019B960494DF}">
-                  <a14:hiddenLine xmlns:a14="http://schemas.microsoft.com/office/drawing/2010/main" xmlns="" w="9525">
+                  <a14:hiddenLine xmlns="" xmlns:a14="http://schemas.microsoft.com/office/drawing/2010/main" w="9525">
                     <a:solidFill>
                       <a:srgbClr val="000000"/>
                     </a:solidFill>
@@ -18439,7 +18439,7 @@
               </a:ln>
               <a:extLst>
                 <a:ext uri="{91240B29-F687-4f45-9708-019B960494DF}">
-                  <a14:hiddenLine xmlns:a14="http://schemas.microsoft.com/office/drawing/2010/main" xmlns="" w="9525">
+                  <a14:hiddenLine xmlns="" xmlns:a14="http://schemas.microsoft.com/office/drawing/2010/main" w="9525">
                     <a:solidFill>
                       <a:srgbClr val="000000"/>
                     </a:solidFill>
@@ -18504,7 +18504,7 @@
               </a:ln>
               <a:extLst>
                 <a:ext uri="{91240B29-F687-4f45-9708-019B960494DF}">
-                  <a14:hiddenLine xmlns:a14="http://schemas.microsoft.com/office/drawing/2010/main" xmlns="" w="9525">
+                  <a14:hiddenLine xmlns="" xmlns:a14="http://schemas.microsoft.com/office/drawing/2010/main" w="9525">
                     <a:solidFill>
                       <a:srgbClr val="000000"/>
                     </a:solidFill>
@@ -18624,7 +18624,7 @@
               </a:ln>
               <a:extLst>
                 <a:ext uri="{91240B29-F687-4f45-9708-019B960494DF}">
-                  <a14:hiddenLine xmlns:a14="http://schemas.microsoft.com/office/drawing/2010/main" xmlns="" w="9525">
+                  <a14:hiddenLine xmlns="" xmlns:a14="http://schemas.microsoft.com/office/drawing/2010/main" w="9525">
                     <a:solidFill>
                       <a:srgbClr val="000000"/>
                     </a:solidFill>
@@ -18722,7 +18722,7 @@
               </a:ln>
               <a:extLst>
                 <a:ext uri="{91240B29-F687-4f45-9708-019B960494DF}">
-                  <a14:hiddenLine xmlns:a14="http://schemas.microsoft.com/office/drawing/2010/main" xmlns="" w="9525">
+                  <a14:hiddenLine xmlns="" xmlns:a14="http://schemas.microsoft.com/office/drawing/2010/main" w="9525">
                     <a:solidFill>
                       <a:srgbClr val="000000"/>
                     </a:solidFill>
@@ -18837,7 +18837,7 @@
               </a:ln>
               <a:extLst>
                 <a:ext uri="{91240B29-F687-4f45-9708-019B960494DF}">
-                  <a14:hiddenLine xmlns:a14="http://schemas.microsoft.com/office/drawing/2010/main" xmlns="" w="9525">
+                  <a14:hiddenLine xmlns="" xmlns:a14="http://schemas.microsoft.com/office/drawing/2010/main" w="9525">
                     <a:solidFill>
                       <a:srgbClr val="000000"/>
                     </a:solidFill>
@@ -18927,7 +18927,7 @@
               </a:ln>
               <a:extLst>
                 <a:ext uri="{91240B29-F687-4f45-9708-019B960494DF}">
-                  <a14:hiddenLine xmlns:a14="http://schemas.microsoft.com/office/drawing/2010/main" xmlns="" w="9525">
+                  <a14:hiddenLine xmlns="" xmlns:a14="http://schemas.microsoft.com/office/drawing/2010/main" w="9525">
                     <a:solidFill>
                       <a:srgbClr val="000000"/>
                     </a:solidFill>
@@ -18992,7 +18992,7 @@
               </a:ln>
               <a:extLst>
                 <a:ext uri="{91240B29-F687-4f45-9708-019B960494DF}">
-                  <a14:hiddenLine xmlns:a14="http://schemas.microsoft.com/office/drawing/2010/main" xmlns="" w="9525">
+                  <a14:hiddenLine xmlns="" xmlns:a14="http://schemas.microsoft.com/office/drawing/2010/main" w="9525">
                     <a:solidFill>
                       <a:srgbClr val="000000"/>
                     </a:solidFill>
@@ -19082,7 +19082,7 @@
               </a:ln>
               <a:extLst>
                 <a:ext uri="{91240B29-F687-4f45-9708-019B960494DF}">
-                  <a14:hiddenLine xmlns:a14="http://schemas.microsoft.com/office/drawing/2010/main" xmlns="" w="9525">
+                  <a14:hiddenLine xmlns="" xmlns:a14="http://schemas.microsoft.com/office/drawing/2010/main" w="9525">
                     <a:solidFill>
                       <a:srgbClr val="000000"/>
                     </a:solidFill>
@@ -19150,7 +19150,7 @@
               </a:ln>
               <a:extLst>
                 <a:ext uri="{91240B29-F687-4f45-9708-019B960494DF}">
-                  <a14:hiddenLine xmlns:a14="http://schemas.microsoft.com/office/drawing/2010/main" xmlns="" w="9525">
+                  <a14:hiddenLine xmlns="" xmlns:a14="http://schemas.microsoft.com/office/drawing/2010/main" w="9525">
                     <a:solidFill>
                       <a:srgbClr val="000000"/>
                     </a:solidFill>
@@ -19240,7 +19240,7 @@
               </a:ln>
               <a:extLst>
                 <a:ext uri="{91240B29-F687-4f45-9708-019B960494DF}">
-                  <a14:hiddenLine xmlns:a14="http://schemas.microsoft.com/office/drawing/2010/main" xmlns="" w="9525">
+                  <a14:hiddenLine xmlns="" xmlns:a14="http://schemas.microsoft.com/office/drawing/2010/main" w="9525">
                     <a:solidFill>
                       <a:srgbClr val="000000"/>
                     </a:solidFill>
@@ -19308,7 +19308,7 @@
               </a:ln>
               <a:extLst>
                 <a:ext uri="{91240B29-F687-4f45-9708-019B960494DF}">
-                  <a14:hiddenLine xmlns:a14="http://schemas.microsoft.com/office/drawing/2010/main" xmlns="" w="9525">
+                  <a14:hiddenLine xmlns="" xmlns:a14="http://schemas.microsoft.com/office/drawing/2010/main" w="9525">
                     <a:solidFill>
                       <a:srgbClr val="000000"/>
                     </a:solidFill>
@@ -19398,7 +19398,7 @@
               </a:ln>
               <a:extLst>
                 <a:ext uri="{91240B29-F687-4f45-9708-019B960494DF}">
-                  <a14:hiddenLine xmlns:a14="http://schemas.microsoft.com/office/drawing/2010/main" xmlns="" w="9525">
+                  <a14:hiddenLine xmlns="" xmlns:a14="http://schemas.microsoft.com/office/drawing/2010/main" w="9525">
                     <a:solidFill>
                       <a:srgbClr val="000000"/>
                     </a:solidFill>
@@ -19432,7 +19432,7 @@
               </a:ln>
               <a:extLst>
                 <a:ext uri="{91240B29-F687-4f45-9708-019B960494DF}">
-                  <a14:hiddenLine xmlns:a14="http://schemas.microsoft.com/office/drawing/2010/main" xmlns="" w="9525">
+                  <a14:hiddenLine xmlns="" xmlns:a14="http://schemas.microsoft.com/office/drawing/2010/main" w="9525">
                     <a:solidFill>
                       <a:srgbClr val="000000"/>
                     </a:solidFill>
@@ -19573,7 +19573,7 @@
             <a:fld id="{48A87A34-81AB-432B-8DAE-1953F412C126}" type="datetimeFigureOut">
               <a:rPr lang="en-US" dirty="0"/>
               <a:pPr/>
-              <a:t>12/7/2015</a:t>
+              <a:t>12/8/2015</a:t>
             </a:fld>
             <a:endParaRPr lang="en-US" dirty="0"/>
           </a:p>
@@ -20275,7 +20275,7 @@
         </p:spPr>
         <p:txBody>
           <a:bodyPr>
-            <a:normAutofit fontScale="77500" lnSpcReduction="20000"/>
+            <a:normAutofit fontScale="85000" lnSpcReduction="20000"/>
           </a:bodyPr>
           <a:lstStyle/>
           <a:p>
@@ -20631,7 +20631,7 @@
           <a:bodyPr/>
           <a:lstStyle/>
           <a:p>
-            <a:endParaRPr lang="en-IN"/>
+            <a:endParaRPr lang="en-IN" dirty="0"/>
           </a:p>
         </p:txBody>
       </p:sp>
@@ -20768,15 +20768,7 @@
             <a:pPr lvl="2"/>
             <a:r>
               <a:rPr lang="en-IN" dirty="0" smtClean="0"/>
-              <a:t>Heart rate to </a:t>
-            </a:r>
-            <a:r>
-              <a:rPr lang="en-IN" dirty="0" smtClean="0"/>
-              <a:t>detect </a:t>
-            </a:r>
-            <a:r>
-              <a:rPr lang="en-IN" dirty="0" smtClean="0"/>
-              <a:t>spike or fall</a:t>
+              <a:t>Heart rate to detect spike or fall</a:t>
             </a:r>
           </a:p>
           <a:p>
@@ -20882,8 +20874,8 @@
         </p:nvSpPr>
         <p:spPr>
           <a:xfrm>
-            <a:off x="5278902" y="2112208"/>
-            <a:ext cx="1494720" cy="1813320"/>
+            <a:off x="5274222" y="1658510"/>
+            <a:ext cx="1494720" cy="2273373"/>
           </a:xfrm>
           <a:prstGeom prst="rect">
             <a:avLst/>
@@ -20907,7 +20899,12 @@
                 <a:spcPct val="100000"/>
               </a:lnSpc>
             </a:pPr>
-            <a:endParaRPr dirty="0"/>
+            <a:endParaRPr lang="en-US" sz="1200" b="1" dirty="0" smtClean="0">
+              <a:solidFill>
+                <a:srgbClr val="000000"/>
+              </a:solidFill>
+              <a:latin typeface="Calibri"/>
+            </a:endParaRPr>
           </a:p>
           <a:p>
             <a:pPr algn="ctr">
@@ -20915,7 +20912,51 @@
                 <a:spcPct val="100000"/>
               </a:lnSpc>
             </a:pPr>
-            <a:endParaRPr dirty="0"/>
+            <a:endParaRPr lang="en-US" sz="1200" b="1" dirty="0">
+              <a:solidFill>
+                <a:srgbClr val="000000"/>
+              </a:solidFill>
+              <a:latin typeface="Calibri"/>
+            </a:endParaRPr>
+          </a:p>
+          <a:p>
+            <a:pPr algn="ctr">
+              <a:lnSpc>
+                <a:spcPct val="100000"/>
+              </a:lnSpc>
+            </a:pPr>
+            <a:endParaRPr lang="en-US" sz="1200" b="1" dirty="0" smtClean="0">
+              <a:solidFill>
+                <a:srgbClr val="000000"/>
+              </a:solidFill>
+              <a:latin typeface="Calibri"/>
+            </a:endParaRPr>
+          </a:p>
+          <a:p>
+            <a:pPr algn="ctr">
+              <a:lnSpc>
+                <a:spcPct val="100000"/>
+              </a:lnSpc>
+            </a:pPr>
+            <a:endParaRPr lang="en-US" sz="1200" b="1" dirty="0">
+              <a:solidFill>
+                <a:srgbClr val="000000"/>
+              </a:solidFill>
+              <a:latin typeface="Calibri"/>
+            </a:endParaRPr>
+          </a:p>
+          <a:p>
+            <a:pPr algn="ctr">
+              <a:lnSpc>
+                <a:spcPct val="100000"/>
+              </a:lnSpc>
+            </a:pPr>
+            <a:endParaRPr lang="en-US" sz="1200" b="1" dirty="0" smtClean="0">
+              <a:solidFill>
+                <a:srgbClr val="000000"/>
+              </a:solidFill>
+              <a:latin typeface="Calibri"/>
+            </a:endParaRPr>
           </a:p>
           <a:p>
             <a:pPr algn="ctr">
@@ -20924,7 +20965,7 @@
               </a:lnSpc>
             </a:pPr>
             <a:r>
-              <a:rPr lang="en-US" sz="1200" b="1" dirty="0">
+              <a:rPr lang="en-US" sz="1200" b="1" dirty="0" smtClean="0">
                 <a:solidFill>
                   <a:srgbClr val="000000"/>
                 </a:solidFill>
@@ -20933,7 +20974,7 @@
               <a:t>MSP-430EXPFR6989</a:t>
             </a:r>
             <a:r>
-              <a:rPr lang="en-US" sz="1600" b="1" dirty="0">
+              <a:rPr lang="en-US" sz="1600" b="1" dirty="0" smtClean="0">
                 <a:solidFill>
                   <a:srgbClr val="000000"/>
                 </a:solidFill>
@@ -21049,7 +21090,7 @@
         <p:spPr>
           <a:xfrm>
             <a:off x="3221502" y="2737168"/>
-            <a:ext cx="1494720" cy="456840"/>
+            <a:ext cx="1494720" cy="548280"/>
           </a:xfrm>
           <a:prstGeom prst="rect">
             <a:avLst/>
@@ -21074,7 +21115,7 @@
               </a:lnSpc>
             </a:pPr>
             <a:r>
-              <a:rPr lang="en-US" sz="1400" b="1" dirty="0">
+              <a:rPr lang="en-US" sz="1400" b="1" dirty="0" smtClean="0">
                 <a:solidFill>
                   <a:srgbClr val="000000"/>
                 </a:solidFill>
@@ -21082,7 +21123,40 @@
               </a:rPr>
               <a:t>Gyro</a:t>
             </a:r>
-            <a:endParaRPr b="1" dirty="0"/>
+          </a:p>
+          <a:p>
+            <a:pPr algn="ctr">
+              <a:lnSpc>
+                <a:spcPct val="100000"/>
+              </a:lnSpc>
+            </a:pPr>
+            <a:r>
+              <a:rPr lang="en-US" sz="1400" b="1" dirty="0" smtClean="0">
+                <a:solidFill>
+                  <a:srgbClr val="000000"/>
+                </a:solidFill>
+                <a:latin typeface="Calibri"/>
+              </a:rPr>
+              <a:t>LSM9DS0</a:t>
+            </a:r>
+            <a:endParaRPr lang="en-US" sz="1400" b="1" dirty="0" smtClean="0">
+              <a:solidFill>
+                <a:srgbClr val="000000"/>
+              </a:solidFill>
+              <a:latin typeface="Calibri"/>
+            </a:endParaRPr>
+          </a:p>
+          <a:p>
+            <a:pPr algn="ctr">
+              <a:lnSpc>
+                <a:spcPct val="100000"/>
+              </a:lnSpc>
+            </a:pPr>
+            <a:endParaRPr b="1" dirty="0">
+              <a:solidFill>
+                <a:schemeClr val="bg1"/>
+              </a:solidFill>
+            </a:endParaRPr>
           </a:p>
         </p:txBody>
       </p:sp>
@@ -21095,7 +21169,7 @@
         <p:spPr>
           <a:xfrm>
             <a:off x="3221502" y="3377248"/>
-            <a:ext cx="1494720" cy="456840"/>
+            <a:ext cx="1494720" cy="547920"/>
           </a:xfrm>
           <a:prstGeom prst="rect">
             <a:avLst/>
@@ -21120,7 +21194,23 @@
               </a:lnSpc>
             </a:pPr>
             <a:r>
-              <a:rPr lang="en-US" sz="1400" b="1" dirty="0">
+              <a:rPr lang="en-US" sz="1400" b="1" dirty="0" smtClean="0">
+                <a:solidFill>
+                  <a:srgbClr val="000000"/>
+                </a:solidFill>
+                <a:latin typeface="Calibri"/>
+              </a:rPr>
+              <a:t>4*3 matrix</a:t>
+            </a:r>
+          </a:p>
+          <a:p>
+            <a:pPr algn="ctr">
+              <a:lnSpc>
+                <a:spcPct val="100000"/>
+              </a:lnSpc>
+            </a:pPr>
+            <a:r>
+              <a:rPr lang="en-US" sz="1400" b="1" dirty="0" smtClean="0">
                 <a:solidFill>
                   <a:srgbClr val="000000"/>
                 </a:solidFill>
@@ -21189,7 +21279,7 @@
         <p:spPr>
           <a:xfrm>
             <a:off x="7505502" y="2737168"/>
-            <a:ext cx="1494720" cy="548280"/>
+            <a:ext cx="1494720" cy="731160"/>
           </a:xfrm>
           <a:prstGeom prst="rect">
             <a:avLst/>
@@ -21214,7 +21304,47 @@
               </a:lnSpc>
             </a:pPr>
             <a:r>
-              <a:rPr lang="en-US" sz="1400" b="1" dirty="0">
+              <a:rPr lang="en-US" sz="1400" b="1" dirty="0" err="1" smtClean="0">
+                <a:solidFill>
+                  <a:srgbClr val="000000"/>
+                </a:solidFill>
+                <a:latin typeface="Calibri"/>
+              </a:rPr>
+              <a:t>Adafruit</a:t>
+            </a:r>
+            <a:r>
+              <a:rPr lang="en-US" sz="1400" b="1" dirty="0" smtClean="0">
+                <a:solidFill>
+                  <a:srgbClr val="000000"/>
+                </a:solidFill>
+                <a:latin typeface="Calibri"/>
+              </a:rPr>
+              <a:t> </a:t>
+            </a:r>
+            <a:r>
+              <a:rPr lang="en-US" sz="1400" b="1" dirty="0" err="1" smtClean="0">
+                <a:solidFill>
+                  <a:srgbClr val="000000"/>
+                </a:solidFill>
+                <a:latin typeface="Calibri"/>
+              </a:rPr>
+              <a:t>fona</a:t>
+            </a:r>
+            <a:endParaRPr lang="en-US" sz="1400" b="1" dirty="0" smtClean="0">
+              <a:solidFill>
+                <a:srgbClr val="000000"/>
+              </a:solidFill>
+              <a:latin typeface="Calibri"/>
+            </a:endParaRPr>
+          </a:p>
+          <a:p>
+            <a:pPr algn="ctr">
+              <a:lnSpc>
+                <a:spcPct val="100000"/>
+              </a:lnSpc>
+            </a:pPr>
+            <a:r>
+              <a:rPr lang="en-US" sz="1400" b="1" dirty="0" smtClean="0">
                 <a:solidFill>
                   <a:srgbClr val="000000"/>
                 </a:solidFill>
@@ -21443,9 +21573,9 @@
           <p:nvPr/>
         </p:nvSpPr>
         <p:spPr>
-          <a:xfrm flipV="1">
-            <a:off x="8237022" y="3285808"/>
-            <a:ext cx="360" cy="547920"/>
+          <a:xfrm flipH="1" flipV="1">
+            <a:off x="8281555" y="3468327"/>
+            <a:ext cx="2587" cy="327835"/>
           </a:xfrm>
           <a:prstGeom prst="straightConnector1">
             <a:avLst/>
@@ -22117,6 +22247,13 @@
   <p:clrMapOvr>
     <a:masterClrMapping/>
   </p:clrMapOvr>
+  <p:timing>
+    <p:tnLst>
+      <p:par>
+        <p:cTn id="1" dur="indefinite" restart="never" nodeType="tmRoot"/>
+      </p:par>
+    </p:tnLst>
+  </p:timing>
 </p:sld>
 </file>
 
@@ -22223,7 +22360,6 @@
               <a:rPr lang="en-IN" dirty="0" smtClean="0"/>
               <a:t> – 3D design</a:t>
             </a:r>
-            <a:endParaRPr lang="en-IN" dirty="0" smtClean="0"/>
           </a:p>
           <a:p>
             <a:r>

</xml_diff>